<commit_message>
Update 03 Presentación - CDIA.pptx
revisión por pares locales
</commit_message>
<xml_diff>
--- a/03 Presentación - CDIA.pptx
+++ b/03 Presentación - CDIA.pptx
@@ -3631,7 +3631,7 @@
         <p:spPr/>
         <p:txBody>
           <a:bodyPr>
-            <a:normAutofit fontScale="62500" lnSpcReduction="20000"/>
+            <a:normAutofit fontScale="55000" lnSpcReduction="20000"/>
           </a:bodyPr>
           <a:lstStyle/>
           <a:p>
@@ -3841,6 +3841,28 @@
               <a:t>Song, F., Agarwal, A., &amp; Wen, W. (2024). The Impact of Generative AI on Collaborative Open-Source Software Development: Evidence from GitHub Copilot.</a:t>
             </a:r>
             <a:endParaRPr lang="es-EC" dirty="0"/>
+          </a:p>
+          <a:p>
+            <a:r>
+              <a:rPr lang="en-US" dirty="0"/>
+              <a:t>Al-</a:t>
+            </a:r>
+            <a:r>
+              <a:rPr lang="en-US" dirty="0" err="1"/>
+              <a:t>Raeei</a:t>
+            </a:r>
+            <a:r>
+              <a:rPr lang="en-US" dirty="0"/>
+              <a:t>, M. (2025). The smart future for sustainable development: Artificial intelligence solutions for sustainable urbanization. Sustainable Development, 508–517. </a:t>
+            </a:r>
+            <a:r>
+              <a:rPr lang="en-US" dirty="0" err="1"/>
+              <a:t>doi:https</a:t>
+            </a:r>
+            <a:r>
+              <a:rPr lang="en-US" dirty="0"/>
+              <a:t>://doi.org/10.1002/sd.3131</a:t>
+            </a:r>
           </a:p>
         </p:txBody>
       </p:sp>
@@ -3921,7 +3943,7 @@
         <p:spPr/>
         <p:txBody>
           <a:bodyPr>
-            <a:normAutofit fontScale="77500" lnSpcReduction="20000"/>
+            <a:normAutofit fontScale="92500" lnSpcReduction="20000"/>
           </a:bodyPr>
           <a:lstStyle/>
           <a:p>
@@ -4019,42 +4041,28 @@
             <a:pPr lvl="1"/>
             <a:r>
               <a:rPr lang="es-EC" dirty="0"/>
-              <a:t>Aprendizaje Basado en Proyectos, Aprendizaje Basado en Problemas, Aprendizaje Cooperativo, y Aula Invertida</a:t>
+              <a:t>Aprendizaje Basado en Proyectos: DAWM </a:t>
             </a:r>
           </a:p>
           <a:p>
             <a:pPr lvl="1"/>
             <a:r>
               <a:rPr lang="es-EC" dirty="0"/>
-              <a:t>Modelo Educativo de la ESPOL</a:t>
-            </a:r>
-          </a:p>
-          <a:p>
-            <a:pPr lvl="2"/>
-            <a:r>
-              <a:rPr lang="es-ES" dirty="0"/>
-              <a:t>Participación en procesos de investigación</a:t>
-            </a:r>
-          </a:p>
-          <a:p>
-            <a:pPr lvl="2"/>
-            <a:r>
-              <a:rPr lang="es-ES" dirty="0"/>
-              <a:t>Involucramiento en proyectos que resuelven los problemas de la industria</a:t>
-            </a:r>
-          </a:p>
-          <a:p>
-            <a:pPr lvl="2"/>
-            <a:r>
-              <a:rPr lang="es-ES" dirty="0"/>
-              <a:t>Participación en equipos multidisciplinarios</a:t>
-            </a:r>
-          </a:p>
-          <a:p>
-            <a:pPr lvl="2"/>
-            <a:r>
-              <a:rPr lang="es-ES" dirty="0"/>
-              <a:t>En el contexto de litoral ecuatoriano</a:t>
+              <a:t>Aprendizaje Basado en Problemas: ICDIA</a:t>
+            </a:r>
+          </a:p>
+          <a:p>
+            <a:pPr lvl="1"/>
+            <a:r>
+              <a:rPr lang="es-EC" dirty="0"/>
+              <a:t>Aprendizaje Cooperativo: FIA</a:t>
+            </a:r>
+          </a:p>
+          <a:p>
+            <a:pPr lvl="1"/>
+            <a:r>
+              <a:rPr lang="es-EC" dirty="0"/>
+              <a:t>Aula Invertida: clases en línea</a:t>
             </a:r>
           </a:p>
         </p:txBody>
@@ -4063,6 +4071,1118 @@
     <p:extLst>
       <p:ext uri="{BB962C8B-B14F-4D97-AF65-F5344CB8AC3E}">
         <p14:creationId xmlns:p14="http://schemas.microsoft.com/office/powerpoint/2010/main" val="627968237"/>
+      </p:ext>
+    </p:extLst>
+  </p:cSld>
+  <p:clrMapOvr>
+    <a:masterClrMapping/>
+  </p:clrMapOvr>
+  <p:timing>
+    <p:tnLst>
+      <p:par>
+        <p:cTn id="1" dur="indefinite" restart="never" nodeType="tmRoot">
+          <p:childTnLst>
+            <p:seq concurrent="1" nextAc="seek">
+              <p:cTn id="2" dur="indefinite" nodeType="mainSeq">
+                <p:childTnLst>
+                  <p:par>
+                    <p:cTn id="3" fill="hold">
+                      <p:stCondLst>
+                        <p:cond delay="indefinite"/>
+                      </p:stCondLst>
+                      <p:childTnLst>
+                        <p:par>
+                          <p:cTn id="4" fill="hold">
+                            <p:stCondLst>
+                              <p:cond delay="0"/>
+                            </p:stCondLst>
+                            <p:childTnLst>
+                              <p:par>
+                                <p:cTn id="5" presetID="1" presetClass="entr" presetSubtype="0" fill="hold" grpId="0" nodeType="clickEffect">
+                                  <p:stCondLst>
+                                    <p:cond delay="0"/>
+                                  </p:stCondLst>
+                                  <p:childTnLst>
+                                    <p:set>
+                                      <p:cBhvr>
+                                        <p:cTn id="6" dur="1" fill="hold">
+                                          <p:stCondLst>
+                                            <p:cond delay="0"/>
+                                          </p:stCondLst>
+                                        </p:cTn>
+                                        <p:tgtEl>
+                                          <p:spTgt spid="3">
+                                            <p:txEl>
+                                              <p:pRg st="0" end="0"/>
+                                            </p:txEl>
+                                          </p:spTgt>
+                                        </p:tgtEl>
+                                        <p:attrNameLst>
+                                          <p:attrName>style.visibility</p:attrName>
+                                        </p:attrNameLst>
+                                      </p:cBhvr>
+                                      <p:to>
+                                        <p:strVal val="visible"/>
+                                      </p:to>
+                                    </p:set>
+                                  </p:childTnLst>
+                                </p:cTn>
+                              </p:par>
+                              <p:par>
+                                <p:cTn id="7" presetID="1" presetClass="entr" presetSubtype="0" fill="hold" grpId="0" nodeType="withEffect">
+                                  <p:stCondLst>
+                                    <p:cond delay="0"/>
+                                  </p:stCondLst>
+                                  <p:childTnLst>
+                                    <p:set>
+                                      <p:cBhvr>
+                                        <p:cTn id="8" dur="1" fill="hold">
+                                          <p:stCondLst>
+                                            <p:cond delay="0"/>
+                                          </p:stCondLst>
+                                        </p:cTn>
+                                        <p:tgtEl>
+                                          <p:spTgt spid="3">
+                                            <p:txEl>
+                                              <p:pRg st="2" end="2"/>
+                                            </p:txEl>
+                                          </p:spTgt>
+                                        </p:tgtEl>
+                                        <p:attrNameLst>
+                                          <p:attrName>style.visibility</p:attrName>
+                                        </p:attrNameLst>
+                                      </p:cBhvr>
+                                      <p:to>
+                                        <p:strVal val="visible"/>
+                                      </p:to>
+                                    </p:set>
+                                  </p:childTnLst>
+                                </p:cTn>
+                              </p:par>
+                              <p:par>
+                                <p:cTn id="9" presetID="1" presetClass="entr" presetSubtype="0" fill="hold" grpId="0" nodeType="withEffect">
+                                  <p:stCondLst>
+                                    <p:cond delay="0"/>
+                                  </p:stCondLst>
+                                  <p:childTnLst>
+                                    <p:set>
+                                      <p:cBhvr>
+                                        <p:cTn id="10" dur="1" fill="hold">
+                                          <p:stCondLst>
+                                            <p:cond delay="0"/>
+                                          </p:stCondLst>
+                                        </p:cTn>
+                                        <p:tgtEl>
+                                          <p:spTgt spid="3">
+                                            <p:txEl>
+                                              <p:pRg st="3" end="3"/>
+                                            </p:txEl>
+                                          </p:spTgt>
+                                        </p:tgtEl>
+                                        <p:attrNameLst>
+                                          <p:attrName>style.visibility</p:attrName>
+                                        </p:attrNameLst>
+                                      </p:cBhvr>
+                                      <p:to>
+                                        <p:strVal val="visible"/>
+                                      </p:to>
+                                    </p:set>
+                                  </p:childTnLst>
+                                </p:cTn>
+                              </p:par>
+                              <p:par>
+                                <p:cTn id="11" presetID="1" presetClass="entr" presetSubtype="0" fill="hold" grpId="0" nodeType="withEffect">
+                                  <p:stCondLst>
+                                    <p:cond delay="0"/>
+                                  </p:stCondLst>
+                                  <p:childTnLst>
+                                    <p:set>
+                                      <p:cBhvr>
+                                        <p:cTn id="12" dur="1" fill="hold">
+                                          <p:stCondLst>
+                                            <p:cond delay="0"/>
+                                          </p:stCondLst>
+                                        </p:cTn>
+                                        <p:tgtEl>
+                                          <p:spTgt spid="3">
+                                            <p:txEl>
+                                              <p:pRg st="4" end="4"/>
+                                            </p:txEl>
+                                          </p:spTgt>
+                                        </p:tgtEl>
+                                        <p:attrNameLst>
+                                          <p:attrName>style.visibility</p:attrName>
+                                        </p:attrNameLst>
+                                      </p:cBhvr>
+                                      <p:to>
+                                        <p:strVal val="visible"/>
+                                      </p:to>
+                                    </p:set>
+                                  </p:childTnLst>
+                                </p:cTn>
+                              </p:par>
+                            </p:childTnLst>
+                          </p:cTn>
+                        </p:par>
+                      </p:childTnLst>
+                    </p:cTn>
+                  </p:par>
+                  <p:par>
+                    <p:cTn id="13" fill="hold">
+                      <p:stCondLst>
+                        <p:cond delay="indefinite"/>
+                      </p:stCondLst>
+                      <p:childTnLst>
+                        <p:par>
+                          <p:cTn id="14" fill="hold">
+                            <p:stCondLst>
+                              <p:cond delay="0"/>
+                            </p:stCondLst>
+                            <p:childTnLst>
+                              <p:par>
+                                <p:cTn id="15" presetID="1" presetClass="entr" presetSubtype="0" fill="hold" grpId="0" nodeType="clickEffect">
+                                  <p:stCondLst>
+                                    <p:cond delay="0"/>
+                                  </p:stCondLst>
+                                  <p:childTnLst>
+                                    <p:set>
+                                      <p:cBhvr>
+                                        <p:cTn id="16" dur="1" fill="hold">
+                                          <p:stCondLst>
+                                            <p:cond delay="0"/>
+                                          </p:stCondLst>
+                                        </p:cTn>
+                                        <p:tgtEl>
+                                          <p:spTgt spid="3">
+                                            <p:txEl>
+                                              <p:pRg st="6" end="6"/>
+                                            </p:txEl>
+                                          </p:spTgt>
+                                        </p:tgtEl>
+                                        <p:attrNameLst>
+                                          <p:attrName>style.visibility</p:attrName>
+                                        </p:attrNameLst>
+                                      </p:cBhvr>
+                                      <p:to>
+                                        <p:strVal val="visible"/>
+                                      </p:to>
+                                    </p:set>
+                                  </p:childTnLst>
+                                </p:cTn>
+                              </p:par>
+                              <p:par>
+                                <p:cTn id="17" presetID="1" presetClass="entr" presetSubtype="0" fill="hold" grpId="0" nodeType="withEffect">
+                                  <p:stCondLst>
+                                    <p:cond delay="0"/>
+                                  </p:stCondLst>
+                                  <p:childTnLst>
+                                    <p:set>
+                                      <p:cBhvr>
+                                        <p:cTn id="18" dur="1" fill="hold">
+                                          <p:stCondLst>
+                                            <p:cond delay="0"/>
+                                          </p:stCondLst>
+                                        </p:cTn>
+                                        <p:tgtEl>
+                                          <p:spTgt spid="3">
+                                            <p:txEl>
+                                              <p:pRg st="8" end="8"/>
+                                            </p:txEl>
+                                          </p:spTgt>
+                                        </p:tgtEl>
+                                        <p:attrNameLst>
+                                          <p:attrName>style.visibility</p:attrName>
+                                        </p:attrNameLst>
+                                      </p:cBhvr>
+                                      <p:to>
+                                        <p:strVal val="visible"/>
+                                      </p:to>
+                                    </p:set>
+                                  </p:childTnLst>
+                                </p:cTn>
+                              </p:par>
+                              <p:par>
+                                <p:cTn id="19" presetID="1" presetClass="entr" presetSubtype="0" fill="hold" grpId="0" nodeType="withEffect">
+                                  <p:stCondLst>
+                                    <p:cond delay="0"/>
+                                  </p:stCondLst>
+                                  <p:childTnLst>
+                                    <p:set>
+                                      <p:cBhvr>
+                                        <p:cTn id="20" dur="1" fill="hold">
+                                          <p:stCondLst>
+                                            <p:cond delay="0"/>
+                                          </p:stCondLst>
+                                        </p:cTn>
+                                        <p:tgtEl>
+                                          <p:spTgt spid="3">
+                                            <p:txEl>
+                                              <p:pRg st="9" end="9"/>
+                                            </p:txEl>
+                                          </p:spTgt>
+                                        </p:tgtEl>
+                                        <p:attrNameLst>
+                                          <p:attrName>style.visibility</p:attrName>
+                                        </p:attrNameLst>
+                                      </p:cBhvr>
+                                      <p:to>
+                                        <p:strVal val="visible"/>
+                                      </p:to>
+                                    </p:set>
+                                  </p:childTnLst>
+                                </p:cTn>
+                              </p:par>
+                              <p:par>
+                                <p:cTn id="21" presetID="1" presetClass="entr" presetSubtype="0" fill="hold" grpId="0" nodeType="withEffect">
+                                  <p:stCondLst>
+                                    <p:cond delay="0"/>
+                                  </p:stCondLst>
+                                  <p:childTnLst>
+                                    <p:set>
+                                      <p:cBhvr>
+                                        <p:cTn id="22" dur="1" fill="hold">
+                                          <p:stCondLst>
+                                            <p:cond delay="0"/>
+                                          </p:stCondLst>
+                                        </p:cTn>
+                                        <p:tgtEl>
+                                          <p:spTgt spid="3">
+                                            <p:txEl>
+                                              <p:pRg st="10" end="10"/>
+                                            </p:txEl>
+                                          </p:spTgt>
+                                        </p:tgtEl>
+                                        <p:attrNameLst>
+                                          <p:attrName>style.visibility</p:attrName>
+                                        </p:attrNameLst>
+                                      </p:cBhvr>
+                                      <p:to>
+                                        <p:strVal val="visible"/>
+                                      </p:to>
+                                    </p:set>
+                                  </p:childTnLst>
+                                </p:cTn>
+                              </p:par>
+                              <p:par>
+                                <p:cTn id="23" presetID="1" presetClass="entr" presetSubtype="0" fill="hold" grpId="0" nodeType="withEffect">
+                                  <p:stCondLst>
+                                    <p:cond delay="0"/>
+                                  </p:stCondLst>
+                                  <p:childTnLst>
+                                    <p:set>
+                                      <p:cBhvr>
+                                        <p:cTn id="24" dur="1" fill="hold">
+                                          <p:stCondLst>
+                                            <p:cond delay="0"/>
+                                          </p:stCondLst>
+                                        </p:cTn>
+                                        <p:tgtEl>
+                                          <p:spTgt spid="3">
+                                            <p:txEl>
+                                              <p:pRg st="11" end="11"/>
+                                            </p:txEl>
+                                          </p:spTgt>
+                                        </p:tgtEl>
+                                        <p:attrNameLst>
+                                          <p:attrName>style.visibility</p:attrName>
+                                        </p:attrNameLst>
+                                      </p:cBhvr>
+                                      <p:to>
+                                        <p:strVal val="visible"/>
+                                      </p:to>
+                                    </p:set>
+                                  </p:childTnLst>
+                                </p:cTn>
+                              </p:par>
+                            </p:childTnLst>
+                          </p:cTn>
+                        </p:par>
+                      </p:childTnLst>
+                    </p:cTn>
+                  </p:par>
+                </p:childTnLst>
+              </p:cTn>
+              <p:prevCondLst>
+                <p:cond evt="onPrev" delay="0">
+                  <p:tgtEl>
+                    <p:sldTgt/>
+                  </p:tgtEl>
+                </p:cond>
+              </p:prevCondLst>
+              <p:nextCondLst>
+                <p:cond evt="onNext" delay="0">
+                  <p:tgtEl>
+                    <p:sldTgt/>
+                  </p:tgtEl>
+                </p:cond>
+              </p:nextCondLst>
+            </p:seq>
+          </p:childTnLst>
+        </p:cTn>
+      </p:par>
+    </p:tnLst>
+    <p:bldLst>
+      <p:bldP spid="3" grpId="0" build="p"/>
+    </p:bldLst>
+  </p:timing>
+</p:sld>
+</file>
+
+<file path=ppt/slides/slide3.xml><?xml version="1.0" encoding="utf-8"?>
+<p:sld xmlns:a="http://schemas.openxmlformats.org/drawingml/2006/main" xmlns:r="http://schemas.openxmlformats.org/officeDocument/2006/relationships" xmlns:p="http://schemas.openxmlformats.org/presentationml/2006/main">
+  <p:cSld>
+    <p:spTree>
+      <p:nvGrpSpPr>
+        <p:cNvPr id="1" name=""/>
+        <p:cNvGrpSpPr/>
+        <p:nvPr/>
+      </p:nvGrpSpPr>
+      <p:grpSpPr>
+        <a:xfrm>
+          <a:off x="0" y="0"/>
+          <a:ext cx="0" cy="0"/>
+          <a:chOff x="0" y="0"/>
+          <a:chExt cx="0" cy="0"/>
+        </a:xfrm>
+      </p:grpSpPr>
+      <p:sp>
+        <p:nvSpPr>
+          <p:cNvPr id="2" name="Título 1">
+            <a:extLst>
+              <a:ext uri="{FF2B5EF4-FFF2-40B4-BE49-F238E27FC236}">
+                <a16:creationId xmlns:a16="http://schemas.microsoft.com/office/drawing/2014/main" id="{C307A1FE-ED21-32E6-E71B-C49A28238C11}"/>
+              </a:ext>
+            </a:extLst>
+          </p:cNvPr>
+          <p:cNvSpPr>
+            <a:spLocks noGrp="1"/>
+          </p:cNvSpPr>
+          <p:nvPr>
+            <p:ph type="title"/>
+          </p:nvPr>
+        </p:nvSpPr>
+        <p:spPr/>
+        <p:txBody>
+          <a:bodyPr/>
+          <a:lstStyle/>
+          <a:p>
+            <a:r>
+              <a:rPr lang="es-EC" dirty="0"/>
+              <a:t>1. Fundamentación Epistemológica</a:t>
+            </a:r>
+          </a:p>
+        </p:txBody>
+      </p:sp>
+      <p:sp>
+        <p:nvSpPr>
+          <p:cNvPr id="3" name="Marcador de contenido 2">
+            <a:extLst>
+              <a:ext uri="{FF2B5EF4-FFF2-40B4-BE49-F238E27FC236}">
+                <a16:creationId xmlns:a16="http://schemas.microsoft.com/office/drawing/2014/main" id="{10D9F8E9-7E6B-293E-9D4F-20EF36A779A0}"/>
+              </a:ext>
+            </a:extLst>
+          </p:cNvPr>
+          <p:cNvSpPr>
+            <a:spLocks noGrp="1"/>
+          </p:cNvSpPr>
+          <p:nvPr>
+            <p:ph idx="1"/>
+          </p:nvPr>
+        </p:nvSpPr>
+        <p:spPr/>
+        <p:txBody>
+          <a:bodyPr/>
+          <a:lstStyle/>
+          <a:p>
+            <a:pPr marL="514350" indent="-514350">
+              <a:buFont typeface="+mj-lt"/>
+              <a:buAutoNum type="arabicPeriod" startAt="3"/>
+            </a:pPr>
+            <a:r>
+              <a:rPr lang="es-ES" dirty="0"/>
+              <a:t>Inclusión de Diversas Perspectivas</a:t>
+            </a:r>
+          </a:p>
+          <a:p>
+            <a:pPr marL="0" indent="0">
+              <a:buNone/>
+            </a:pPr>
+            <a:endParaRPr lang="es-ES" dirty="0"/>
+          </a:p>
+          <a:p>
+            <a:pPr lvl="1"/>
+            <a:r>
+              <a:rPr lang="en-US" dirty="0"/>
+              <a:t>Bases </a:t>
+            </a:r>
+            <a:r>
+              <a:rPr lang="en-US" dirty="0" err="1"/>
+              <a:t>interdisciplinarias</a:t>
+            </a:r>
+            <a:endParaRPr lang="en-US" dirty="0"/>
+          </a:p>
+          <a:p>
+            <a:pPr lvl="1"/>
+            <a:r>
+              <a:rPr lang="en-US" dirty="0"/>
+              <a:t>Computing Competencies for Undergraduate </a:t>
+            </a:r>
+            <a:r>
+              <a:rPr lang="en-US" b="1" dirty="0"/>
+              <a:t>Data Science Curricula </a:t>
+            </a:r>
+            <a:r>
+              <a:rPr lang="en-US" dirty="0"/>
+              <a:t>ACM Data Science Task Force – 2021 (ACM, 2021)</a:t>
+            </a:r>
+          </a:p>
+          <a:p>
+            <a:pPr lvl="2"/>
+            <a:r>
+              <a:rPr lang="es-EC" sz="1800" i="1" dirty="0">
+                <a:latin typeface="Times New Roman" panose="02020603050405020304" pitchFamily="18" charset="0"/>
+                <a:ea typeface="Times New Roman" panose="02020603050405020304" pitchFamily="18" charset="0"/>
+              </a:rPr>
+              <a:t>F</a:t>
+            </a:r>
+            <a:r>
+              <a:rPr lang="es-EC" sz="1800" i="1" dirty="0">
+                <a:effectLst/>
+                <a:latin typeface="Times New Roman" panose="02020603050405020304" pitchFamily="18" charset="0"/>
+                <a:ea typeface="Times New Roman" panose="02020603050405020304" pitchFamily="18" charset="0"/>
+              </a:rPr>
+              <a:t>undamentos computacionales, razonamiento estadístico, gestión de datos, comunicación de resultados, implicaciones éticas y trabajo interdisciplinario</a:t>
+            </a:r>
+            <a:r>
+              <a:rPr lang="en-US" sz="1800" i="1" dirty="0">
+                <a:effectLst/>
+                <a:latin typeface="Times New Roman" panose="02020603050405020304" pitchFamily="18" charset="0"/>
+                <a:ea typeface="Times New Roman" panose="02020603050405020304" pitchFamily="18" charset="0"/>
+              </a:rPr>
+              <a:t>.</a:t>
+            </a:r>
+            <a:endParaRPr lang="en-US" dirty="0"/>
+          </a:p>
+          <a:p>
+            <a:pPr lvl="1"/>
+            <a:r>
+              <a:rPr lang="es-EC" b="1" dirty="0"/>
+              <a:t>Computer Science Curricula </a:t>
+            </a:r>
+            <a:r>
+              <a:rPr lang="es-EC" dirty="0"/>
+              <a:t>2023 (</a:t>
+            </a:r>
+            <a:r>
+              <a:rPr lang="es-EC" dirty="0" err="1"/>
+              <a:t>Amruth</a:t>
+            </a:r>
+            <a:r>
+              <a:rPr lang="es-EC" dirty="0"/>
+              <a:t> N. Kumar, 2024)</a:t>
+            </a:r>
+          </a:p>
+          <a:p>
+            <a:pPr lvl="2"/>
+            <a:r>
+              <a:rPr lang="es-EC" sz="1800" i="1" dirty="0">
+                <a:latin typeface="Times New Roman" panose="02020603050405020304" pitchFamily="18" charset="0"/>
+                <a:ea typeface="Times New Roman" panose="02020603050405020304" pitchFamily="18" charset="0"/>
+              </a:rPr>
+              <a:t>I</a:t>
+            </a:r>
+            <a:r>
+              <a:rPr lang="es-EC" sz="1800" i="1" dirty="0">
+                <a:effectLst/>
+                <a:latin typeface="Times New Roman" panose="02020603050405020304" pitchFamily="18" charset="0"/>
+                <a:ea typeface="Times New Roman" panose="02020603050405020304" pitchFamily="18" charset="0"/>
+              </a:rPr>
+              <a:t>ntegración de la inteligencia artificial en campos emergentes como la salud digital, el cambio climático, la ética algorítmica y los sistemas de recomendación generativo</a:t>
+            </a:r>
+          </a:p>
+          <a:p>
+            <a:pPr lvl="1"/>
+            <a:r>
+              <a:rPr lang="es-EC" dirty="0"/>
+              <a:t>Enfoque multidimensional: ética, crítica y socialmente consciente</a:t>
+            </a:r>
+          </a:p>
+          <a:p>
+            <a:pPr marL="914400" lvl="1" indent="-457200">
+              <a:buFont typeface="+mj-lt"/>
+              <a:buAutoNum type="arabicPeriod" startAt="3"/>
+            </a:pPr>
+            <a:endParaRPr lang="es-EC" dirty="0"/>
+          </a:p>
+          <a:p>
+            <a:endParaRPr lang="es-EC" dirty="0"/>
+          </a:p>
+        </p:txBody>
+      </p:sp>
+    </p:spTree>
+    <p:extLst>
+      <p:ext uri="{BB962C8B-B14F-4D97-AF65-F5344CB8AC3E}">
+        <p14:creationId xmlns:p14="http://schemas.microsoft.com/office/powerpoint/2010/main" val="2560185957"/>
+      </p:ext>
+    </p:extLst>
+  </p:cSld>
+  <p:clrMapOvr>
+    <a:masterClrMapping/>
+  </p:clrMapOvr>
+  <p:timing>
+    <p:tnLst>
+      <p:par>
+        <p:cTn id="1" dur="indefinite" restart="never" nodeType="tmRoot">
+          <p:childTnLst>
+            <p:seq concurrent="1" nextAc="seek">
+              <p:cTn id="2" dur="indefinite" nodeType="mainSeq">
+                <p:childTnLst>
+                  <p:par>
+                    <p:cTn id="3" fill="hold">
+                      <p:stCondLst>
+                        <p:cond delay="indefinite"/>
+                      </p:stCondLst>
+                      <p:childTnLst>
+                        <p:par>
+                          <p:cTn id="4" fill="hold">
+                            <p:stCondLst>
+                              <p:cond delay="0"/>
+                            </p:stCondLst>
+                            <p:childTnLst>
+                              <p:par>
+                                <p:cTn id="5" presetID="1" presetClass="entr" presetSubtype="0" fill="hold" grpId="0" nodeType="clickEffect">
+                                  <p:stCondLst>
+                                    <p:cond delay="0"/>
+                                  </p:stCondLst>
+                                  <p:childTnLst>
+                                    <p:set>
+                                      <p:cBhvr>
+                                        <p:cTn id="6" dur="1" fill="hold">
+                                          <p:stCondLst>
+                                            <p:cond delay="0"/>
+                                          </p:stCondLst>
+                                        </p:cTn>
+                                        <p:tgtEl>
+                                          <p:spTgt spid="2"/>
+                                        </p:tgtEl>
+                                        <p:attrNameLst>
+                                          <p:attrName>style.visibility</p:attrName>
+                                        </p:attrNameLst>
+                                      </p:cBhvr>
+                                      <p:to>
+                                        <p:strVal val="visible"/>
+                                      </p:to>
+                                    </p:set>
+                                  </p:childTnLst>
+                                </p:cTn>
+                              </p:par>
+                            </p:childTnLst>
+                          </p:cTn>
+                        </p:par>
+                      </p:childTnLst>
+                    </p:cTn>
+                  </p:par>
+                  <p:par>
+                    <p:cTn id="7" fill="hold">
+                      <p:stCondLst>
+                        <p:cond delay="indefinite"/>
+                      </p:stCondLst>
+                      <p:childTnLst>
+                        <p:par>
+                          <p:cTn id="8" fill="hold">
+                            <p:stCondLst>
+                              <p:cond delay="0"/>
+                            </p:stCondLst>
+                            <p:childTnLst>
+                              <p:par>
+                                <p:cTn id="9" presetID="1" presetClass="entr" presetSubtype="0" fill="hold" grpId="0" nodeType="clickEffect">
+                                  <p:stCondLst>
+                                    <p:cond delay="0"/>
+                                  </p:stCondLst>
+                                  <p:childTnLst>
+                                    <p:set>
+                                      <p:cBhvr>
+                                        <p:cTn id="10" dur="1" fill="hold">
+                                          <p:stCondLst>
+                                            <p:cond delay="0"/>
+                                          </p:stCondLst>
+                                        </p:cTn>
+                                        <p:tgtEl>
+                                          <p:spTgt spid="3">
+                                            <p:txEl>
+                                              <p:pRg st="0" end="0"/>
+                                            </p:txEl>
+                                          </p:spTgt>
+                                        </p:tgtEl>
+                                        <p:attrNameLst>
+                                          <p:attrName>style.visibility</p:attrName>
+                                        </p:attrNameLst>
+                                      </p:cBhvr>
+                                      <p:to>
+                                        <p:strVal val="visible"/>
+                                      </p:to>
+                                    </p:set>
+                                  </p:childTnLst>
+                                </p:cTn>
+                              </p:par>
+                              <p:par>
+                                <p:cTn id="11" presetID="1" presetClass="entr" presetSubtype="0" fill="hold" grpId="0" nodeType="withEffect">
+                                  <p:stCondLst>
+                                    <p:cond delay="0"/>
+                                  </p:stCondLst>
+                                  <p:childTnLst>
+                                    <p:set>
+                                      <p:cBhvr>
+                                        <p:cTn id="12" dur="1" fill="hold">
+                                          <p:stCondLst>
+                                            <p:cond delay="0"/>
+                                          </p:stCondLst>
+                                        </p:cTn>
+                                        <p:tgtEl>
+                                          <p:spTgt spid="3">
+                                            <p:txEl>
+                                              <p:pRg st="2" end="2"/>
+                                            </p:txEl>
+                                          </p:spTgt>
+                                        </p:tgtEl>
+                                        <p:attrNameLst>
+                                          <p:attrName>style.visibility</p:attrName>
+                                        </p:attrNameLst>
+                                      </p:cBhvr>
+                                      <p:to>
+                                        <p:strVal val="visible"/>
+                                      </p:to>
+                                    </p:set>
+                                  </p:childTnLst>
+                                </p:cTn>
+                              </p:par>
+                              <p:par>
+                                <p:cTn id="13" presetID="1" presetClass="entr" presetSubtype="0" fill="hold" grpId="0" nodeType="withEffect">
+                                  <p:stCondLst>
+                                    <p:cond delay="0"/>
+                                  </p:stCondLst>
+                                  <p:childTnLst>
+                                    <p:set>
+                                      <p:cBhvr>
+                                        <p:cTn id="14" dur="1" fill="hold">
+                                          <p:stCondLst>
+                                            <p:cond delay="0"/>
+                                          </p:stCondLst>
+                                        </p:cTn>
+                                        <p:tgtEl>
+                                          <p:spTgt spid="3">
+                                            <p:txEl>
+                                              <p:pRg st="3" end="3"/>
+                                            </p:txEl>
+                                          </p:spTgt>
+                                        </p:tgtEl>
+                                        <p:attrNameLst>
+                                          <p:attrName>style.visibility</p:attrName>
+                                        </p:attrNameLst>
+                                      </p:cBhvr>
+                                      <p:to>
+                                        <p:strVal val="visible"/>
+                                      </p:to>
+                                    </p:set>
+                                  </p:childTnLst>
+                                </p:cTn>
+                              </p:par>
+                              <p:par>
+                                <p:cTn id="15" presetID="1" presetClass="entr" presetSubtype="0" fill="hold" grpId="0" nodeType="withEffect">
+                                  <p:stCondLst>
+                                    <p:cond delay="0"/>
+                                  </p:stCondLst>
+                                  <p:childTnLst>
+                                    <p:set>
+                                      <p:cBhvr>
+                                        <p:cTn id="16" dur="1" fill="hold">
+                                          <p:stCondLst>
+                                            <p:cond delay="0"/>
+                                          </p:stCondLst>
+                                        </p:cTn>
+                                        <p:tgtEl>
+                                          <p:spTgt spid="3">
+                                            <p:txEl>
+                                              <p:pRg st="4" end="4"/>
+                                            </p:txEl>
+                                          </p:spTgt>
+                                        </p:tgtEl>
+                                        <p:attrNameLst>
+                                          <p:attrName>style.visibility</p:attrName>
+                                        </p:attrNameLst>
+                                      </p:cBhvr>
+                                      <p:to>
+                                        <p:strVal val="visible"/>
+                                      </p:to>
+                                    </p:set>
+                                  </p:childTnLst>
+                                </p:cTn>
+                              </p:par>
+                              <p:par>
+                                <p:cTn id="17" presetID="1" presetClass="entr" presetSubtype="0" fill="hold" grpId="0" nodeType="withEffect">
+                                  <p:stCondLst>
+                                    <p:cond delay="0"/>
+                                  </p:stCondLst>
+                                  <p:childTnLst>
+                                    <p:set>
+                                      <p:cBhvr>
+                                        <p:cTn id="18" dur="1" fill="hold">
+                                          <p:stCondLst>
+                                            <p:cond delay="0"/>
+                                          </p:stCondLst>
+                                        </p:cTn>
+                                        <p:tgtEl>
+                                          <p:spTgt spid="3">
+                                            <p:txEl>
+                                              <p:pRg st="5" end="5"/>
+                                            </p:txEl>
+                                          </p:spTgt>
+                                        </p:tgtEl>
+                                        <p:attrNameLst>
+                                          <p:attrName>style.visibility</p:attrName>
+                                        </p:attrNameLst>
+                                      </p:cBhvr>
+                                      <p:to>
+                                        <p:strVal val="visible"/>
+                                      </p:to>
+                                    </p:set>
+                                  </p:childTnLst>
+                                </p:cTn>
+                              </p:par>
+                              <p:par>
+                                <p:cTn id="19" presetID="1" presetClass="entr" presetSubtype="0" fill="hold" grpId="0" nodeType="withEffect">
+                                  <p:stCondLst>
+                                    <p:cond delay="0"/>
+                                  </p:stCondLst>
+                                  <p:childTnLst>
+                                    <p:set>
+                                      <p:cBhvr>
+                                        <p:cTn id="20" dur="1" fill="hold">
+                                          <p:stCondLst>
+                                            <p:cond delay="0"/>
+                                          </p:stCondLst>
+                                        </p:cTn>
+                                        <p:tgtEl>
+                                          <p:spTgt spid="3">
+                                            <p:txEl>
+                                              <p:pRg st="6" end="6"/>
+                                            </p:txEl>
+                                          </p:spTgt>
+                                        </p:tgtEl>
+                                        <p:attrNameLst>
+                                          <p:attrName>style.visibility</p:attrName>
+                                        </p:attrNameLst>
+                                      </p:cBhvr>
+                                      <p:to>
+                                        <p:strVal val="visible"/>
+                                      </p:to>
+                                    </p:set>
+                                  </p:childTnLst>
+                                </p:cTn>
+                              </p:par>
+                              <p:par>
+                                <p:cTn id="21" presetID="1" presetClass="entr" presetSubtype="0" fill="hold" grpId="0" nodeType="withEffect">
+                                  <p:stCondLst>
+                                    <p:cond delay="0"/>
+                                  </p:stCondLst>
+                                  <p:childTnLst>
+                                    <p:set>
+                                      <p:cBhvr>
+                                        <p:cTn id="22" dur="1" fill="hold">
+                                          <p:stCondLst>
+                                            <p:cond delay="0"/>
+                                          </p:stCondLst>
+                                        </p:cTn>
+                                        <p:tgtEl>
+                                          <p:spTgt spid="3">
+                                            <p:txEl>
+                                              <p:pRg st="7" end="7"/>
+                                            </p:txEl>
+                                          </p:spTgt>
+                                        </p:tgtEl>
+                                        <p:attrNameLst>
+                                          <p:attrName>style.visibility</p:attrName>
+                                        </p:attrNameLst>
+                                      </p:cBhvr>
+                                      <p:to>
+                                        <p:strVal val="visible"/>
+                                      </p:to>
+                                    </p:set>
+                                  </p:childTnLst>
+                                </p:cTn>
+                              </p:par>
+                            </p:childTnLst>
+                          </p:cTn>
+                        </p:par>
+                      </p:childTnLst>
+                    </p:cTn>
+                  </p:par>
+                </p:childTnLst>
+              </p:cTn>
+              <p:prevCondLst>
+                <p:cond evt="onPrev" delay="0">
+                  <p:tgtEl>
+                    <p:sldTgt/>
+                  </p:tgtEl>
+                </p:cond>
+              </p:prevCondLst>
+              <p:nextCondLst>
+                <p:cond evt="onNext" delay="0">
+                  <p:tgtEl>
+                    <p:sldTgt/>
+                  </p:tgtEl>
+                </p:cond>
+              </p:nextCondLst>
+            </p:seq>
+          </p:childTnLst>
+        </p:cTn>
+      </p:par>
+    </p:tnLst>
+    <p:bldLst>
+      <p:bldP spid="2" grpId="0"/>
+      <p:bldP spid="3" grpId="0" build="p"/>
+    </p:bldLst>
+  </p:timing>
+</p:sld>
+</file>
+
+<file path=ppt/slides/slide4.xml><?xml version="1.0" encoding="utf-8"?>
+<p:sld xmlns:a="http://schemas.openxmlformats.org/drawingml/2006/main" xmlns:r="http://schemas.openxmlformats.org/officeDocument/2006/relationships" xmlns:p="http://schemas.openxmlformats.org/presentationml/2006/main">
+  <p:cSld>
+    <p:spTree>
+      <p:nvGrpSpPr>
+        <p:cNvPr id="1" name=""/>
+        <p:cNvGrpSpPr/>
+        <p:nvPr/>
+      </p:nvGrpSpPr>
+      <p:grpSpPr>
+        <a:xfrm>
+          <a:off x="0" y="0"/>
+          <a:ext cx="0" cy="0"/>
+          <a:chOff x="0" y="0"/>
+          <a:chExt cx="0" cy="0"/>
+        </a:xfrm>
+      </p:grpSpPr>
+      <p:sp>
+        <p:nvSpPr>
+          <p:cNvPr id="2" name="Título 1">
+            <a:extLst>
+              <a:ext uri="{FF2B5EF4-FFF2-40B4-BE49-F238E27FC236}">
+                <a16:creationId xmlns:a16="http://schemas.microsoft.com/office/drawing/2014/main" id="{9473B421-7C77-2BA7-401B-032DC83CBD90}"/>
+              </a:ext>
+            </a:extLst>
+          </p:cNvPr>
+          <p:cNvSpPr>
+            <a:spLocks noGrp="1"/>
+          </p:cNvSpPr>
+          <p:nvPr>
+            <p:ph type="title"/>
+          </p:nvPr>
+        </p:nvSpPr>
+        <p:spPr/>
+        <p:txBody>
+          <a:bodyPr/>
+          <a:lstStyle/>
+          <a:p>
+            <a:r>
+              <a:rPr lang="es-ES" dirty="0"/>
+              <a:t>2. Pertinencia de la Carrera</a:t>
+            </a:r>
+            <a:endParaRPr lang="es-EC" dirty="0"/>
+          </a:p>
+        </p:txBody>
+      </p:sp>
+      <p:sp>
+        <p:nvSpPr>
+          <p:cNvPr id="3" name="Marcador de contenido 2">
+            <a:extLst>
+              <a:ext uri="{FF2B5EF4-FFF2-40B4-BE49-F238E27FC236}">
+                <a16:creationId xmlns:a16="http://schemas.microsoft.com/office/drawing/2014/main" id="{0D5B802F-8CE6-3CC7-A4E8-F33011F8CB35}"/>
+              </a:ext>
+            </a:extLst>
+          </p:cNvPr>
+          <p:cNvSpPr>
+            <a:spLocks noGrp="1"/>
+          </p:cNvSpPr>
+          <p:nvPr>
+            <p:ph idx="1"/>
+          </p:nvPr>
+        </p:nvSpPr>
+        <p:spPr/>
+        <p:txBody>
+          <a:bodyPr>
+            <a:normAutofit fontScale="70000" lnSpcReduction="20000"/>
+          </a:bodyPr>
+          <a:lstStyle/>
+          <a:p>
+            <a:pPr marL="514350" indent="-514350">
+              <a:buFont typeface="+mj-lt"/>
+              <a:buAutoNum type="arabicPeriod"/>
+            </a:pPr>
+            <a:r>
+              <a:rPr lang="es-ES" dirty="0"/>
+              <a:t>Respuesta a las Necesidades Nacionales (Planificación , 2024)</a:t>
+            </a:r>
+          </a:p>
+          <a:p>
+            <a:pPr marL="0" indent="0">
+              <a:buNone/>
+            </a:pPr>
+            <a:endParaRPr lang="es-ES" dirty="0"/>
+          </a:p>
+          <a:p>
+            <a:pPr lvl="1"/>
+            <a:r>
+              <a:rPr lang="es-ES" b="1" dirty="0"/>
+              <a:t>Política 2.4: </a:t>
+            </a:r>
+            <a:r>
+              <a:rPr lang="es-ES" dirty="0"/>
+              <a:t>Desarrollar el sistema de educación superior a través de nuevas </a:t>
+            </a:r>
+            <a:r>
+              <a:rPr lang="es-ES" u="sng" dirty="0"/>
+              <a:t>modalidades de estudio</a:t>
+            </a:r>
+            <a:r>
+              <a:rPr lang="es-ES" dirty="0"/>
+              <a:t>, carreras y </a:t>
+            </a:r>
+            <a:r>
+              <a:rPr lang="es-ES" u="sng" dirty="0"/>
+              <a:t>profundización de la educación técnica tecnológica</a:t>
+            </a:r>
+            <a:r>
+              <a:rPr lang="es-ES" dirty="0"/>
+              <a:t> como mecanismo para la profesionalización de la población.</a:t>
+            </a:r>
+          </a:p>
+          <a:p>
+            <a:pPr lvl="1"/>
+            <a:r>
+              <a:rPr lang="es-EC" i="1" dirty="0"/>
+              <a:t>La Agenda Digital 2025 (</a:t>
+            </a:r>
+            <a:r>
+              <a:rPr lang="es-EC" i="1" dirty="0" err="1"/>
+              <a:t>MinEdu</a:t>
+            </a:r>
+            <a:r>
+              <a:rPr lang="es-EC" i="1" dirty="0"/>
+              <a:t>): </a:t>
+            </a:r>
+          </a:p>
+          <a:p>
+            <a:pPr lvl="1"/>
+            <a:r>
+              <a:rPr lang="es-EC" i="1" dirty="0"/>
+              <a:t>El Plan Nacional de Innovación Educativa y Transformación Digital (</a:t>
+            </a:r>
+            <a:r>
+              <a:rPr lang="es-EC" i="1" dirty="0" err="1"/>
+              <a:t>MinTel</a:t>
+            </a:r>
+            <a:r>
+              <a:rPr lang="es-EC" i="1" dirty="0"/>
+              <a:t>):</a:t>
+            </a:r>
+          </a:p>
+          <a:p>
+            <a:pPr marL="457200" lvl="1" indent="0">
+              <a:buNone/>
+            </a:pPr>
+            <a:endParaRPr lang="es-ES" dirty="0"/>
+          </a:p>
+          <a:p>
+            <a:pPr marL="514350" indent="-514350">
+              <a:buFont typeface="+mj-lt"/>
+              <a:buAutoNum type="arabicPeriod" startAt="2"/>
+            </a:pPr>
+            <a:r>
+              <a:rPr lang="es-ES" dirty="0"/>
+              <a:t>Respuesta a Necesidades Globales (ONU, 2024)</a:t>
+            </a:r>
+          </a:p>
+          <a:p>
+            <a:pPr marL="0" indent="0">
+              <a:buNone/>
+            </a:pPr>
+            <a:endParaRPr lang="es-ES" dirty="0"/>
+          </a:p>
+          <a:p>
+            <a:pPr lvl="1"/>
+            <a:r>
+              <a:rPr lang="es-ES" b="1" dirty="0"/>
+              <a:t>ODS 4 (Educación de Calidad)</a:t>
+            </a:r>
+            <a:r>
+              <a:rPr lang="es-ES" dirty="0"/>
+              <a:t>: </a:t>
+            </a:r>
+            <a:r>
+              <a:rPr lang="es-ES" i="1" dirty="0"/>
+              <a:t>modalidades de aprendizaje</a:t>
+            </a:r>
+          </a:p>
+          <a:p>
+            <a:pPr lvl="1"/>
+            <a:r>
+              <a:rPr lang="es-ES" b="1" dirty="0"/>
+              <a:t>ODS 9 (Industria, Innovación e Infraestructura): </a:t>
+            </a:r>
+            <a:r>
+              <a:rPr lang="es-ES" i="1" dirty="0"/>
+              <a:t>automatización de procesos industriales</a:t>
+            </a:r>
+          </a:p>
+          <a:p>
+            <a:pPr marL="457200" lvl="1" indent="0">
+              <a:buNone/>
+            </a:pPr>
+            <a:r>
+              <a:rPr lang="es-ES" dirty="0"/>
+              <a:t> </a:t>
+            </a:r>
+          </a:p>
+          <a:p>
+            <a:pPr lvl="1"/>
+            <a:r>
+              <a:rPr lang="es-EC" i="1" dirty="0"/>
+              <a:t>ODS 11 (Ciudades y Comunidades Sostenibles): planificación urbana inteligente</a:t>
+            </a:r>
+          </a:p>
+          <a:p>
+            <a:pPr lvl="1"/>
+            <a:r>
+              <a:rPr lang="es-EC" i="1" dirty="0"/>
+              <a:t>ODS 3 (Salud y Bienestar): modelos predictivos para diagnóstico temprano de enfermedades</a:t>
+            </a:r>
+          </a:p>
+          <a:p>
+            <a:pPr lvl="1"/>
+            <a:r>
+              <a:rPr lang="es-EC" i="1" dirty="0"/>
+              <a:t>ODS 13 (Acción por el Clima): </a:t>
+            </a:r>
+            <a:r>
+              <a:rPr lang="es-ES" i="1" dirty="0"/>
+              <a:t>simulaciones en la evaluación de riesgos climáticos </a:t>
+            </a:r>
+            <a:endParaRPr lang="es-ES" dirty="0"/>
+          </a:p>
+          <a:p>
+            <a:pPr marL="971550" lvl="1" indent="-514350">
+              <a:buFont typeface="+mj-lt"/>
+              <a:buAutoNum type="arabicPeriod"/>
+            </a:pPr>
+            <a:endParaRPr lang="es-ES" dirty="0"/>
+          </a:p>
+        </p:txBody>
+      </p:sp>
+    </p:spTree>
+    <p:extLst>
+      <p:ext uri="{BB962C8B-B14F-4D97-AF65-F5344CB8AC3E}">
+        <p14:creationId xmlns:p14="http://schemas.microsoft.com/office/powerpoint/2010/main" val="444112001"/>
       </p:ext>
     </p:extLst>
   </p:cSld>
@@ -4482,1048 +5602,6 @@
 </p:sld>
 </file>
 
-<file path=ppt/slides/slide3.xml><?xml version="1.0" encoding="utf-8"?>
-<p:sld xmlns:a="http://schemas.openxmlformats.org/drawingml/2006/main" xmlns:r="http://schemas.openxmlformats.org/officeDocument/2006/relationships" xmlns:p="http://schemas.openxmlformats.org/presentationml/2006/main">
-  <p:cSld>
-    <p:spTree>
-      <p:nvGrpSpPr>
-        <p:cNvPr id="1" name=""/>
-        <p:cNvGrpSpPr/>
-        <p:nvPr/>
-      </p:nvGrpSpPr>
-      <p:grpSpPr>
-        <a:xfrm>
-          <a:off x="0" y="0"/>
-          <a:ext cx="0" cy="0"/>
-          <a:chOff x="0" y="0"/>
-          <a:chExt cx="0" cy="0"/>
-        </a:xfrm>
-      </p:grpSpPr>
-      <p:sp>
-        <p:nvSpPr>
-          <p:cNvPr id="2" name="Título 1">
-            <a:extLst>
-              <a:ext uri="{FF2B5EF4-FFF2-40B4-BE49-F238E27FC236}">
-                <a16:creationId xmlns:a16="http://schemas.microsoft.com/office/drawing/2014/main" id="{C307A1FE-ED21-32E6-E71B-C49A28238C11}"/>
-              </a:ext>
-            </a:extLst>
-          </p:cNvPr>
-          <p:cNvSpPr>
-            <a:spLocks noGrp="1"/>
-          </p:cNvSpPr>
-          <p:nvPr>
-            <p:ph type="title"/>
-          </p:nvPr>
-        </p:nvSpPr>
-        <p:spPr/>
-        <p:txBody>
-          <a:bodyPr/>
-          <a:lstStyle/>
-          <a:p>
-            <a:r>
-              <a:rPr lang="es-EC" dirty="0"/>
-              <a:t>1. Fundamentación Epistemológica</a:t>
-            </a:r>
-          </a:p>
-        </p:txBody>
-      </p:sp>
-      <p:sp>
-        <p:nvSpPr>
-          <p:cNvPr id="3" name="Marcador de contenido 2">
-            <a:extLst>
-              <a:ext uri="{FF2B5EF4-FFF2-40B4-BE49-F238E27FC236}">
-                <a16:creationId xmlns:a16="http://schemas.microsoft.com/office/drawing/2014/main" id="{10D9F8E9-7E6B-293E-9D4F-20EF36A779A0}"/>
-              </a:ext>
-            </a:extLst>
-          </p:cNvPr>
-          <p:cNvSpPr>
-            <a:spLocks noGrp="1"/>
-          </p:cNvSpPr>
-          <p:nvPr>
-            <p:ph idx="1"/>
-          </p:nvPr>
-        </p:nvSpPr>
-        <p:spPr/>
-        <p:txBody>
-          <a:bodyPr/>
-          <a:lstStyle/>
-          <a:p>
-            <a:pPr marL="514350" indent="-514350">
-              <a:buFont typeface="+mj-lt"/>
-              <a:buAutoNum type="arabicPeriod" startAt="3"/>
-            </a:pPr>
-            <a:r>
-              <a:rPr lang="es-ES" dirty="0"/>
-              <a:t>Inclusión de Diversas Perspectivas</a:t>
-            </a:r>
-          </a:p>
-          <a:p>
-            <a:pPr lvl="1"/>
-            <a:r>
-              <a:rPr lang="en-US" dirty="0"/>
-              <a:t>Computing Competencies for Undergraduate </a:t>
-            </a:r>
-            <a:r>
-              <a:rPr lang="en-US" b="1" dirty="0"/>
-              <a:t>Data Science Curricula </a:t>
-            </a:r>
-            <a:r>
-              <a:rPr lang="en-US" dirty="0"/>
-              <a:t>ACM Data Science Task Force – 2021 (ACM, 2021)</a:t>
-            </a:r>
-          </a:p>
-          <a:p>
-            <a:pPr lvl="2"/>
-            <a:r>
-              <a:rPr lang="es-EC" sz="1800" i="1" dirty="0">
-                <a:latin typeface="Times New Roman" panose="02020603050405020304" pitchFamily="18" charset="0"/>
-                <a:ea typeface="Times New Roman" panose="02020603050405020304" pitchFamily="18" charset="0"/>
-              </a:rPr>
-              <a:t>F</a:t>
-            </a:r>
-            <a:r>
-              <a:rPr lang="es-EC" sz="1800" i="1" dirty="0">
-                <a:effectLst/>
-                <a:latin typeface="Times New Roman" panose="02020603050405020304" pitchFamily="18" charset="0"/>
-                <a:ea typeface="Times New Roman" panose="02020603050405020304" pitchFamily="18" charset="0"/>
-              </a:rPr>
-              <a:t>undamentos computacionales, razonamiento estadístico, gestión de datos, comunicación de resultados, implicaciones éticas y trabajo interdisciplinario</a:t>
-            </a:r>
-            <a:r>
-              <a:rPr lang="en-US" sz="1800" i="1" dirty="0">
-                <a:effectLst/>
-                <a:latin typeface="Times New Roman" panose="02020603050405020304" pitchFamily="18" charset="0"/>
-                <a:ea typeface="Times New Roman" panose="02020603050405020304" pitchFamily="18" charset="0"/>
-              </a:rPr>
-              <a:t>.</a:t>
-            </a:r>
-            <a:endParaRPr lang="en-US" dirty="0"/>
-          </a:p>
-          <a:p>
-            <a:pPr lvl="1"/>
-            <a:r>
-              <a:rPr lang="es-EC" b="1" dirty="0"/>
-              <a:t>Computer Science Curricula </a:t>
-            </a:r>
-            <a:r>
-              <a:rPr lang="es-EC" dirty="0"/>
-              <a:t>2023 (</a:t>
-            </a:r>
-            <a:r>
-              <a:rPr lang="es-EC" dirty="0" err="1"/>
-              <a:t>Amruth</a:t>
-            </a:r>
-            <a:r>
-              <a:rPr lang="es-EC" dirty="0"/>
-              <a:t> N. Kumar, 2024)</a:t>
-            </a:r>
-          </a:p>
-          <a:p>
-            <a:pPr lvl="2"/>
-            <a:r>
-              <a:rPr lang="es-EC" sz="1800" i="1" dirty="0">
-                <a:latin typeface="Times New Roman" panose="02020603050405020304" pitchFamily="18" charset="0"/>
-                <a:ea typeface="Times New Roman" panose="02020603050405020304" pitchFamily="18" charset="0"/>
-              </a:rPr>
-              <a:t>I</a:t>
-            </a:r>
-            <a:r>
-              <a:rPr lang="es-EC" sz="1800" i="1" dirty="0">
-                <a:effectLst/>
-                <a:latin typeface="Times New Roman" panose="02020603050405020304" pitchFamily="18" charset="0"/>
-                <a:ea typeface="Times New Roman" panose="02020603050405020304" pitchFamily="18" charset="0"/>
-              </a:rPr>
-              <a:t>ntegración de la inteligencia artificial en campos emergentes como la salud digital, el cambio climático, la ética algorítmica y los sistemas de recomendación generativo</a:t>
-            </a:r>
-            <a:endParaRPr lang="es-EC" dirty="0"/>
-          </a:p>
-          <a:p>
-            <a:pPr marL="914400" lvl="1" indent="-457200">
-              <a:buFont typeface="+mj-lt"/>
-              <a:buAutoNum type="arabicPeriod" startAt="3"/>
-            </a:pPr>
-            <a:endParaRPr lang="es-EC" dirty="0"/>
-          </a:p>
-          <a:p>
-            <a:endParaRPr lang="es-EC" dirty="0"/>
-          </a:p>
-        </p:txBody>
-      </p:sp>
-    </p:spTree>
-    <p:extLst>
-      <p:ext uri="{BB962C8B-B14F-4D97-AF65-F5344CB8AC3E}">
-        <p14:creationId xmlns:p14="http://schemas.microsoft.com/office/powerpoint/2010/main" val="2560185957"/>
-      </p:ext>
-    </p:extLst>
-  </p:cSld>
-  <p:clrMapOvr>
-    <a:masterClrMapping/>
-  </p:clrMapOvr>
-  <p:timing>
-    <p:tnLst>
-      <p:par>
-        <p:cTn id="1" dur="indefinite" restart="never" nodeType="tmRoot">
-          <p:childTnLst>
-            <p:seq concurrent="1" nextAc="seek">
-              <p:cTn id="2" dur="indefinite" nodeType="mainSeq">
-                <p:childTnLst>
-                  <p:par>
-                    <p:cTn id="3" fill="hold">
-                      <p:stCondLst>
-                        <p:cond delay="indefinite"/>
-                      </p:stCondLst>
-                      <p:childTnLst>
-                        <p:par>
-                          <p:cTn id="4" fill="hold">
-                            <p:stCondLst>
-                              <p:cond delay="0"/>
-                            </p:stCondLst>
-                            <p:childTnLst>
-                              <p:par>
-                                <p:cTn id="5" presetID="1" presetClass="entr" presetSubtype="0" fill="hold" grpId="0" nodeType="clickEffect">
-                                  <p:stCondLst>
-                                    <p:cond delay="0"/>
-                                  </p:stCondLst>
-                                  <p:childTnLst>
-                                    <p:set>
-                                      <p:cBhvr>
-                                        <p:cTn id="6" dur="1" fill="hold">
-                                          <p:stCondLst>
-                                            <p:cond delay="0"/>
-                                          </p:stCondLst>
-                                        </p:cTn>
-                                        <p:tgtEl>
-                                          <p:spTgt spid="2"/>
-                                        </p:tgtEl>
-                                        <p:attrNameLst>
-                                          <p:attrName>style.visibility</p:attrName>
-                                        </p:attrNameLst>
-                                      </p:cBhvr>
-                                      <p:to>
-                                        <p:strVal val="visible"/>
-                                      </p:to>
-                                    </p:set>
-                                  </p:childTnLst>
-                                </p:cTn>
-                              </p:par>
-                            </p:childTnLst>
-                          </p:cTn>
-                        </p:par>
-                      </p:childTnLst>
-                    </p:cTn>
-                  </p:par>
-                  <p:par>
-                    <p:cTn id="7" fill="hold">
-                      <p:stCondLst>
-                        <p:cond delay="indefinite"/>
-                      </p:stCondLst>
-                      <p:childTnLst>
-                        <p:par>
-                          <p:cTn id="8" fill="hold">
-                            <p:stCondLst>
-                              <p:cond delay="0"/>
-                            </p:stCondLst>
-                            <p:childTnLst>
-                              <p:par>
-                                <p:cTn id="9" presetID="1" presetClass="entr" presetSubtype="0" fill="hold" grpId="0" nodeType="clickEffect">
-                                  <p:stCondLst>
-                                    <p:cond delay="0"/>
-                                  </p:stCondLst>
-                                  <p:childTnLst>
-                                    <p:set>
-                                      <p:cBhvr>
-                                        <p:cTn id="10" dur="1" fill="hold">
-                                          <p:stCondLst>
-                                            <p:cond delay="0"/>
-                                          </p:stCondLst>
-                                        </p:cTn>
-                                        <p:tgtEl>
-                                          <p:spTgt spid="3">
-                                            <p:txEl>
-                                              <p:pRg st="0" end="0"/>
-                                            </p:txEl>
-                                          </p:spTgt>
-                                        </p:tgtEl>
-                                        <p:attrNameLst>
-                                          <p:attrName>style.visibility</p:attrName>
-                                        </p:attrNameLst>
-                                      </p:cBhvr>
-                                      <p:to>
-                                        <p:strVal val="visible"/>
-                                      </p:to>
-                                    </p:set>
-                                  </p:childTnLst>
-                                </p:cTn>
-                              </p:par>
-                              <p:par>
-                                <p:cTn id="11" presetID="1" presetClass="entr" presetSubtype="0" fill="hold" grpId="0" nodeType="withEffect">
-                                  <p:stCondLst>
-                                    <p:cond delay="0"/>
-                                  </p:stCondLst>
-                                  <p:childTnLst>
-                                    <p:set>
-                                      <p:cBhvr>
-                                        <p:cTn id="12" dur="1" fill="hold">
-                                          <p:stCondLst>
-                                            <p:cond delay="0"/>
-                                          </p:stCondLst>
-                                        </p:cTn>
-                                        <p:tgtEl>
-                                          <p:spTgt spid="3">
-                                            <p:txEl>
-                                              <p:pRg st="1" end="1"/>
-                                            </p:txEl>
-                                          </p:spTgt>
-                                        </p:tgtEl>
-                                        <p:attrNameLst>
-                                          <p:attrName>style.visibility</p:attrName>
-                                        </p:attrNameLst>
-                                      </p:cBhvr>
-                                      <p:to>
-                                        <p:strVal val="visible"/>
-                                      </p:to>
-                                    </p:set>
-                                  </p:childTnLst>
-                                </p:cTn>
-                              </p:par>
-                              <p:par>
-                                <p:cTn id="13" presetID="1" presetClass="entr" presetSubtype="0" fill="hold" grpId="0" nodeType="withEffect">
-                                  <p:stCondLst>
-                                    <p:cond delay="0"/>
-                                  </p:stCondLst>
-                                  <p:childTnLst>
-                                    <p:set>
-                                      <p:cBhvr>
-                                        <p:cTn id="14" dur="1" fill="hold">
-                                          <p:stCondLst>
-                                            <p:cond delay="0"/>
-                                          </p:stCondLst>
-                                        </p:cTn>
-                                        <p:tgtEl>
-                                          <p:spTgt spid="3">
-                                            <p:txEl>
-                                              <p:pRg st="2" end="2"/>
-                                            </p:txEl>
-                                          </p:spTgt>
-                                        </p:tgtEl>
-                                        <p:attrNameLst>
-                                          <p:attrName>style.visibility</p:attrName>
-                                        </p:attrNameLst>
-                                      </p:cBhvr>
-                                      <p:to>
-                                        <p:strVal val="visible"/>
-                                      </p:to>
-                                    </p:set>
-                                  </p:childTnLst>
-                                </p:cTn>
-                              </p:par>
-                              <p:par>
-                                <p:cTn id="15" presetID="1" presetClass="entr" presetSubtype="0" fill="hold" grpId="0" nodeType="withEffect">
-                                  <p:stCondLst>
-                                    <p:cond delay="0"/>
-                                  </p:stCondLst>
-                                  <p:childTnLst>
-                                    <p:set>
-                                      <p:cBhvr>
-                                        <p:cTn id="16" dur="1" fill="hold">
-                                          <p:stCondLst>
-                                            <p:cond delay="0"/>
-                                          </p:stCondLst>
-                                        </p:cTn>
-                                        <p:tgtEl>
-                                          <p:spTgt spid="3">
-                                            <p:txEl>
-                                              <p:pRg st="3" end="3"/>
-                                            </p:txEl>
-                                          </p:spTgt>
-                                        </p:tgtEl>
-                                        <p:attrNameLst>
-                                          <p:attrName>style.visibility</p:attrName>
-                                        </p:attrNameLst>
-                                      </p:cBhvr>
-                                      <p:to>
-                                        <p:strVal val="visible"/>
-                                      </p:to>
-                                    </p:set>
-                                  </p:childTnLst>
-                                </p:cTn>
-                              </p:par>
-                              <p:par>
-                                <p:cTn id="17" presetID="1" presetClass="entr" presetSubtype="0" fill="hold" grpId="0" nodeType="withEffect">
-                                  <p:stCondLst>
-                                    <p:cond delay="0"/>
-                                  </p:stCondLst>
-                                  <p:childTnLst>
-                                    <p:set>
-                                      <p:cBhvr>
-                                        <p:cTn id="18" dur="1" fill="hold">
-                                          <p:stCondLst>
-                                            <p:cond delay="0"/>
-                                          </p:stCondLst>
-                                        </p:cTn>
-                                        <p:tgtEl>
-                                          <p:spTgt spid="3">
-                                            <p:txEl>
-                                              <p:pRg st="4" end="4"/>
-                                            </p:txEl>
-                                          </p:spTgt>
-                                        </p:tgtEl>
-                                        <p:attrNameLst>
-                                          <p:attrName>style.visibility</p:attrName>
-                                        </p:attrNameLst>
-                                      </p:cBhvr>
-                                      <p:to>
-                                        <p:strVal val="visible"/>
-                                      </p:to>
-                                    </p:set>
-                                  </p:childTnLst>
-                                </p:cTn>
-                              </p:par>
-                            </p:childTnLst>
-                          </p:cTn>
-                        </p:par>
-                      </p:childTnLst>
-                    </p:cTn>
-                  </p:par>
-                </p:childTnLst>
-              </p:cTn>
-              <p:prevCondLst>
-                <p:cond evt="onPrev" delay="0">
-                  <p:tgtEl>
-                    <p:sldTgt/>
-                  </p:tgtEl>
-                </p:cond>
-              </p:prevCondLst>
-              <p:nextCondLst>
-                <p:cond evt="onNext" delay="0">
-                  <p:tgtEl>
-                    <p:sldTgt/>
-                  </p:tgtEl>
-                </p:cond>
-              </p:nextCondLst>
-            </p:seq>
-          </p:childTnLst>
-        </p:cTn>
-      </p:par>
-    </p:tnLst>
-    <p:bldLst>
-      <p:bldP spid="2" grpId="0"/>
-      <p:bldP spid="3" grpId="0" build="p"/>
-    </p:bldLst>
-  </p:timing>
-</p:sld>
-</file>
-
-<file path=ppt/slides/slide4.xml><?xml version="1.0" encoding="utf-8"?>
-<p:sld xmlns:a="http://schemas.openxmlformats.org/drawingml/2006/main" xmlns:r="http://schemas.openxmlformats.org/officeDocument/2006/relationships" xmlns:p="http://schemas.openxmlformats.org/presentationml/2006/main">
-  <p:cSld>
-    <p:spTree>
-      <p:nvGrpSpPr>
-        <p:cNvPr id="1" name=""/>
-        <p:cNvGrpSpPr/>
-        <p:nvPr/>
-      </p:nvGrpSpPr>
-      <p:grpSpPr>
-        <a:xfrm>
-          <a:off x="0" y="0"/>
-          <a:ext cx="0" cy="0"/>
-          <a:chOff x="0" y="0"/>
-          <a:chExt cx="0" cy="0"/>
-        </a:xfrm>
-      </p:grpSpPr>
-      <p:sp>
-        <p:nvSpPr>
-          <p:cNvPr id="2" name="Título 1">
-            <a:extLst>
-              <a:ext uri="{FF2B5EF4-FFF2-40B4-BE49-F238E27FC236}">
-                <a16:creationId xmlns:a16="http://schemas.microsoft.com/office/drawing/2014/main" id="{9473B421-7C77-2BA7-401B-032DC83CBD90}"/>
-              </a:ext>
-            </a:extLst>
-          </p:cNvPr>
-          <p:cNvSpPr>
-            <a:spLocks noGrp="1"/>
-          </p:cNvSpPr>
-          <p:nvPr>
-            <p:ph type="title"/>
-          </p:nvPr>
-        </p:nvSpPr>
-        <p:spPr/>
-        <p:txBody>
-          <a:bodyPr/>
-          <a:lstStyle/>
-          <a:p>
-            <a:r>
-              <a:rPr lang="es-ES" dirty="0"/>
-              <a:t>2. Pertinencia de la Carrera</a:t>
-            </a:r>
-            <a:endParaRPr lang="es-EC" dirty="0"/>
-          </a:p>
-        </p:txBody>
-      </p:sp>
-      <p:sp>
-        <p:nvSpPr>
-          <p:cNvPr id="3" name="Marcador de contenido 2">
-            <a:extLst>
-              <a:ext uri="{FF2B5EF4-FFF2-40B4-BE49-F238E27FC236}">
-                <a16:creationId xmlns:a16="http://schemas.microsoft.com/office/drawing/2014/main" id="{0D5B802F-8CE6-3CC7-A4E8-F33011F8CB35}"/>
-              </a:ext>
-            </a:extLst>
-          </p:cNvPr>
-          <p:cNvSpPr>
-            <a:spLocks noGrp="1"/>
-          </p:cNvSpPr>
-          <p:nvPr>
-            <p:ph idx="1"/>
-          </p:nvPr>
-        </p:nvSpPr>
-        <p:spPr/>
-        <p:txBody>
-          <a:bodyPr>
-            <a:normAutofit fontScale="70000" lnSpcReduction="20000"/>
-          </a:bodyPr>
-          <a:lstStyle/>
-          <a:p>
-            <a:pPr marL="514350" indent="-514350">
-              <a:buFont typeface="+mj-lt"/>
-              <a:buAutoNum type="arabicPeriod"/>
-            </a:pPr>
-            <a:r>
-              <a:rPr lang="es-ES" dirty="0"/>
-              <a:t>Respuesta a las Necesidades Nacionales (Planificación , 2024)</a:t>
-            </a:r>
-          </a:p>
-          <a:p>
-            <a:pPr marL="0" indent="0">
-              <a:buNone/>
-            </a:pPr>
-            <a:endParaRPr lang="es-ES" dirty="0"/>
-          </a:p>
-          <a:p>
-            <a:pPr lvl="1"/>
-            <a:r>
-              <a:rPr lang="es-ES" b="1" dirty="0"/>
-              <a:t>Política 2.4: </a:t>
-            </a:r>
-            <a:r>
-              <a:rPr lang="es-ES" dirty="0"/>
-              <a:t>Desarrollar el sistema de educación superior a través de nuevas </a:t>
-            </a:r>
-            <a:r>
-              <a:rPr lang="es-ES" u="sng" dirty="0"/>
-              <a:t>modalidades de estudio</a:t>
-            </a:r>
-            <a:r>
-              <a:rPr lang="es-ES" dirty="0"/>
-              <a:t>, carreras y profundización de la educación técnica tecnológica como mecanismo para la profesionalización de la población.</a:t>
-            </a:r>
-          </a:p>
-          <a:p>
-            <a:pPr lvl="1"/>
-            <a:r>
-              <a:rPr lang="es-EC" i="1" dirty="0"/>
-              <a:t>La Agenda Digital 2025 (</a:t>
-            </a:r>
-            <a:r>
-              <a:rPr lang="es-EC" i="1" dirty="0" err="1"/>
-              <a:t>MinEdu</a:t>
-            </a:r>
-            <a:r>
-              <a:rPr lang="es-EC" i="1" dirty="0"/>
-              <a:t>) y el Plan Nacional de Innovación Educativa y Transformación Digital (</a:t>
-            </a:r>
-            <a:r>
-              <a:rPr lang="es-EC" i="1" dirty="0" err="1"/>
-              <a:t>MinTel</a:t>
-            </a:r>
-            <a:r>
-              <a:rPr lang="es-EC" i="1" dirty="0"/>
-              <a:t>)</a:t>
-            </a:r>
-          </a:p>
-          <a:p>
-            <a:pPr marL="457200" lvl="1" indent="0">
-              <a:buNone/>
-            </a:pPr>
-            <a:endParaRPr lang="es-ES" dirty="0"/>
-          </a:p>
-          <a:p>
-            <a:pPr marL="514350" indent="-514350">
-              <a:buFont typeface="+mj-lt"/>
-              <a:buAutoNum type="arabicPeriod" startAt="2"/>
-            </a:pPr>
-            <a:r>
-              <a:rPr lang="es-ES" dirty="0"/>
-              <a:t>Respuesta a Necesidades Globales (ONU, 2024)</a:t>
-            </a:r>
-          </a:p>
-          <a:p>
-            <a:pPr marL="0" indent="0">
-              <a:buNone/>
-            </a:pPr>
-            <a:endParaRPr lang="es-ES" dirty="0"/>
-          </a:p>
-          <a:p>
-            <a:pPr lvl="1"/>
-            <a:r>
-              <a:rPr lang="es-ES" b="1" dirty="0"/>
-              <a:t>ODS 4 (Educación de Calidad)</a:t>
-            </a:r>
-            <a:r>
-              <a:rPr lang="es-ES" dirty="0"/>
-              <a:t>: </a:t>
-            </a:r>
-            <a:r>
-              <a:rPr lang="es-ES" i="1" dirty="0"/>
-              <a:t>modalidades de aprendizaje</a:t>
-            </a:r>
-          </a:p>
-          <a:p>
-            <a:pPr lvl="1"/>
-            <a:r>
-              <a:rPr lang="es-ES" b="1" dirty="0"/>
-              <a:t>ODS 9 (Industria, Innovación e Infraestructura): </a:t>
-            </a:r>
-            <a:r>
-              <a:rPr lang="es-ES" i="1" dirty="0"/>
-              <a:t>automatización de procesos industriales</a:t>
-            </a:r>
-          </a:p>
-          <a:p>
-            <a:pPr marL="457200" lvl="1" indent="0">
-              <a:buNone/>
-            </a:pPr>
-            <a:r>
-              <a:rPr lang="es-ES" dirty="0"/>
-              <a:t> </a:t>
-            </a:r>
-          </a:p>
-          <a:p>
-            <a:pPr lvl="1"/>
-            <a:r>
-              <a:rPr lang="es-EC" i="1" dirty="0"/>
-              <a:t>ODS 11 (Ciudades y Comunidades Sostenibles): planificación urbana inteligente</a:t>
-            </a:r>
-          </a:p>
-          <a:p>
-            <a:pPr lvl="1"/>
-            <a:r>
-              <a:rPr lang="es-EC" i="1" dirty="0"/>
-              <a:t>ODS 3 (Salud y Bienestar): modelos predictivos para diagnóstico temprano</a:t>
-            </a:r>
-          </a:p>
-          <a:p>
-            <a:pPr lvl="1"/>
-            <a:r>
-              <a:rPr lang="es-EC" i="1" dirty="0"/>
-              <a:t>ODS 13 (Acción por el Clima): </a:t>
-            </a:r>
-            <a:r>
-              <a:rPr lang="es-ES" i="1" dirty="0"/>
-              <a:t>simulaciones en la evaluación de riesgos climáticos </a:t>
-            </a:r>
-            <a:endParaRPr lang="es-ES" dirty="0"/>
-          </a:p>
-          <a:p>
-            <a:pPr marL="971550" lvl="1" indent="-514350">
-              <a:buFont typeface="+mj-lt"/>
-              <a:buAutoNum type="arabicPeriod"/>
-            </a:pPr>
-            <a:endParaRPr lang="es-ES" dirty="0"/>
-          </a:p>
-        </p:txBody>
-      </p:sp>
-    </p:spTree>
-    <p:extLst>
-      <p:ext uri="{BB962C8B-B14F-4D97-AF65-F5344CB8AC3E}">
-        <p14:creationId xmlns:p14="http://schemas.microsoft.com/office/powerpoint/2010/main" val="444112001"/>
-      </p:ext>
-    </p:extLst>
-  </p:cSld>
-  <p:clrMapOvr>
-    <a:masterClrMapping/>
-  </p:clrMapOvr>
-  <p:timing>
-    <p:tnLst>
-      <p:par>
-        <p:cTn id="1" dur="indefinite" restart="never" nodeType="tmRoot">
-          <p:childTnLst>
-            <p:seq concurrent="1" nextAc="seek">
-              <p:cTn id="2" dur="indefinite" nodeType="mainSeq">
-                <p:childTnLst>
-                  <p:par>
-                    <p:cTn id="3" fill="hold">
-                      <p:stCondLst>
-                        <p:cond delay="indefinite"/>
-                      </p:stCondLst>
-                      <p:childTnLst>
-                        <p:par>
-                          <p:cTn id="4" fill="hold">
-                            <p:stCondLst>
-                              <p:cond delay="0"/>
-                            </p:stCondLst>
-                            <p:childTnLst>
-                              <p:par>
-                                <p:cTn id="5" presetID="1" presetClass="entr" presetSubtype="0" fill="hold" grpId="0" nodeType="clickEffect">
-                                  <p:stCondLst>
-                                    <p:cond delay="0"/>
-                                  </p:stCondLst>
-                                  <p:childTnLst>
-                                    <p:set>
-                                      <p:cBhvr>
-                                        <p:cTn id="6" dur="1" fill="hold">
-                                          <p:stCondLst>
-                                            <p:cond delay="0"/>
-                                          </p:stCondLst>
-                                        </p:cTn>
-                                        <p:tgtEl>
-                                          <p:spTgt spid="3">
-                                            <p:txEl>
-                                              <p:pRg st="0" end="0"/>
-                                            </p:txEl>
-                                          </p:spTgt>
-                                        </p:tgtEl>
-                                        <p:attrNameLst>
-                                          <p:attrName>style.visibility</p:attrName>
-                                        </p:attrNameLst>
-                                      </p:cBhvr>
-                                      <p:to>
-                                        <p:strVal val="visible"/>
-                                      </p:to>
-                                    </p:set>
-                                  </p:childTnLst>
-                                </p:cTn>
-                              </p:par>
-                              <p:par>
-                                <p:cTn id="7" presetID="1" presetClass="entr" presetSubtype="0" fill="hold" grpId="0" nodeType="withEffect">
-                                  <p:stCondLst>
-                                    <p:cond delay="0"/>
-                                  </p:stCondLst>
-                                  <p:childTnLst>
-                                    <p:set>
-                                      <p:cBhvr>
-                                        <p:cTn id="8" dur="1" fill="hold">
-                                          <p:stCondLst>
-                                            <p:cond delay="0"/>
-                                          </p:stCondLst>
-                                        </p:cTn>
-                                        <p:tgtEl>
-                                          <p:spTgt spid="3">
-                                            <p:txEl>
-                                              <p:pRg st="2" end="2"/>
-                                            </p:txEl>
-                                          </p:spTgt>
-                                        </p:tgtEl>
-                                        <p:attrNameLst>
-                                          <p:attrName>style.visibility</p:attrName>
-                                        </p:attrNameLst>
-                                      </p:cBhvr>
-                                      <p:to>
-                                        <p:strVal val="visible"/>
-                                      </p:to>
-                                    </p:set>
-                                  </p:childTnLst>
-                                </p:cTn>
-                              </p:par>
-                              <p:par>
-                                <p:cTn id="9" presetID="1" presetClass="entr" presetSubtype="0" fill="hold" grpId="0" nodeType="withEffect">
-                                  <p:stCondLst>
-                                    <p:cond delay="0"/>
-                                  </p:stCondLst>
-                                  <p:childTnLst>
-                                    <p:set>
-                                      <p:cBhvr>
-                                        <p:cTn id="10" dur="1" fill="hold">
-                                          <p:stCondLst>
-                                            <p:cond delay="0"/>
-                                          </p:stCondLst>
-                                        </p:cTn>
-                                        <p:tgtEl>
-                                          <p:spTgt spid="3">
-                                            <p:txEl>
-                                              <p:pRg st="3" end="3"/>
-                                            </p:txEl>
-                                          </p:spTgt>
-                                        </p:tgtEl>
-                                        <p:attrNameLst>
-                                          <p:attrName>style.visibility</p:attrName>
-                                        </p:attrNameLst>
-                                      </p:cBhvr>
-                                      <p:to>
-                                        <p:strVal val="visible"/>
-                                      </p:to>
-                                    </p:set>
-                                  </p:childTnLst>
-                                </p:cTn>
-                              </p:par>
-                            </p:childTnLst>
-                          </p:cTn>
-                        </p:par>
-                      </p:childTnLst>
-                    </p:cTn>
-                  </p:par>
-                  <p:par>
-                    <p:cTn id="11" fill="hold">
-                      <p:stCondLst>
-                        <p:cond delay="indefinite"/>
-                      </p:stCondLst>
-                      <p:childTnLst>
-                        <p:par>
-                          <p:cTn id="12" fill="hold">
-                            <p:stCondLst>
-                              <p:cond delay="0"/>
-                            </p:stCondLst>
-                            <p:childTnLst>
-                              <p:par>
-                                <p:cTn id="13" presetID="1" presetClass="entr" presetSubtype="0" fill="hold" grpId="0" nodeType="clickEffect">
-                                  <p:stCondLst>
-                                    <p:cond delay="0"/>
-                                  </p:stCondLst>
-                                  <p:childTnLst>
-                                    <p:set>
-                                      <p:cBhvr>
-                                        <p:cTn id="14" dur="1" fill="hold">
-                                          <p:stCondLst>
-                                            <p:cond delay="0"/>
-                                          </p:stCondLst>
-                                        </p:cTn>
-                                        <p:tgtEl>
-                                          <p:spTgt spid="3">
-                                            <p:txEl>
-                                              <p:pRg st="5" end="5"/>
-                                            </p:txEl>
-                                          </p:spTgt>
-                                        </p:tgtEl>
-                                        <p:attrNameLst>
-                                          <p:attrName>style.visibility</p:attrName>
-                                        </p:attrNameLst>
-                                      </p:cBhvr>
-                                      <p:to>
-                                        <p:strVal val="visible"/>
-                                      </p:to>
-                                    </p:set>
-                                  </p:childTnLst>
-                                </p:cTn>
-                              </p:par>
-                              <p:par>
-                                <p:cTn id="15" presetID="1" presetClass="entr" presetSubtype="0" fill="hold" grpId="0" nodeType="withEffect">
-                                  <p:stCondLst>
-                                    <p:cond delay="0"/>
-                                  </p:stCondLst>
-                                  <p:childTnLst>
-                                    <p:set>
-                                      <p:cBhvr>
-                                        <p:cTn id="16" dur="1" fill="hold">
-                                          <p:stCondLst>
-                                            <p:cond delay="0"/>
-                                          </p:stCondLst>
-                                        </p:cTn>
-                                        <p:tgtEl>
-                                          <p:spTgt spid="3">
-                                            <p:txEl>
-                                              <p:pRg st="7" end="7"/>
-                                            </p:txEl>
-                                          </p:spTgt>
-                                        </p:tgtEl>
-                                        <p:attrNameLst>
-                                          <p:attrName>style.visibility</p:attrName>
-                                        </p:attrNameLst>
-                                      </p:cBhvr>
-                                      <p:to>
-                                        <p:strVal val="visible"/>
-                                      </p:to>
-                                    </p:set>
-                                  </p:childTnLst>
-                                </p:cTn>
-                              </p:par>
-                              <p:par>
-                                <p:cTn id="17" presetID="1" presetClass="entr" presetSubtype="0" fill="hold" grpId="0" nodeType="withEffect">
-                                  <p:stCondLst>
-                                    <p:cond delay="0"/>
-                                  </p:stCondLst>
-                                  <p:childTnLst>
-                                    <p:set>
-                                      <p:cBhvr>
-                                        <p:cTn id="18" dur="1" fill="hold">
-                                          <p:stCondLst>
-                                            <p:cond delay="0"/>
-                                          </p:stCondLst>
-                                        </p:cTn>
-                                        <p:tgtEl>
-                                          <p:spTgt spid="3">
-                                            <p:txEl>
-                                              <p:pRg st="8" end="8"/>
-                                            </p:txEl>
-                                          </p:spTgt>
-                                        </p:tgtEl>
-                                        <p:attrNameLst>
-                                          <p:attrName>style.visibility</p:attrName>
-                                        </p:attrNameLst>
-                                      </p:cBhvr>
-                                      <p:to>
-                                        <p:strVal val="visible"/>
-                                      </p:to>
-                                    </p:set>
-                                  </p:childTnLst>
-                                </p:cTn>
-                              </p:par>
-                              <p:par>
-                                <p:cTn id="19" presetID="1" presetClass="entr" presetSubtype="0" fill="hold" grpId="0" nodeType="withEffect">
-                                  <p:stCondLst>
-                                    <p:cond delay="0"/>
-                                  </p:stCondLst>
-                                  <p:childTnLst>
-                                    <p:set>
-                                      <p:cBhvr>
-                                        <p:cTn id="20" dur="1" fill="hold">
-                                          <p:stCondLst>
-                                            <p:cond delay="0"/>
-                                          </p:stCondLst>
-                                        </p:cTn>
-                                        <p:tgtEl>
-                                          <p:spTgt spid="3">
-                                            <p:txEl>
-                                              <p:pRg st="9" end="9"/>
-                                            </p:txEl>
-                                          </p:spTgt>
-                                        </p:tgtEl>
-                                        <p:attrNameLst>
-                                          <p:attrName>style.visibility</p:attrName>
-                                        </p:attrNameLst>
-                                      </p:cBhvr>
-                                      <p:to>
-                                        <p:strVal val="visible"/>
-                                      </p:to>
-                                    </p:set>
-                                  </p:childTnLst>
-                                </p:cTn>
-                              </p:par>
-                              <p:par>
-                                <p:cTn id="21" presetID="1" presetClass="entr" presetSubtype="0" fill="hold" grpId="0" nodeType="withEffect">
-                                  <p:stCondLst>
-                                    <p:cond delay="0"/>
-                                  </p:stCondLst>
-                                  <p:childTnLst>
-                                    <p:set>
-                                      <p:cBhvr>
-                                        <p:cTn id="22" dur="1" fill="hold">
-                                          <p:stCondLst>
-                                            <p:cond delay="0"/>
-                                          </p:stCondLst>
-                                        </p:cTn>
-                                        <p:tgtEl>
-                                          <p:spTgt spid="3">
-                                            <p:txEl>
-                                              <p:pRg st="10" end="10"/>
-                                            </p:txEl>
-                                          </p:spTgt>
-                                        </p:tgtEl>
-                                        <p:attrNameLst>
-                                          <p:attrName>style.visibility</p:attrName>
-                                        </p:attrNameLst>
-                                      </p:cBhvr>
-                                      <p:to>
-                                        <p:strVal val="visible"/>
-                                      </p:to>
-                                    </p:set>
-                                  </p:childTnLst>
-                                </p:cTn>
-                              </p:par>
-                              <p:par>
-                                <p:cTn id="23" presetID="1" presetClass="entr" presetSubtype="0" fill="hold" grpId="0" nodeType="withEffect">
-                                  <p:stCondLst>
-                                    <p:cond delay="0"/>
-                                  </p:stCondLst>
-                                  <p:childTnLst>
-                                    <p:set>
-                                      <p:cBhvr>
-                                        <p:cTn id="24" dur="1" fill="hold">
-                                          <p:stCondLst>
-                                            <p:cond delay="0"/>
-                                          </p:stCondLst>
-                                        </p:cTn>
-                                        <p:tgtEl>
-                                          <p:spTgt spid="3">
-                                            <p:txEl>
-                                              <p:pRg st="11" end="11"/>
-                                            </p:txEl>
-                                          </p:spTgt>
-                                        </p:tgtEl>
-                                        <p:attrNameLst>
-                                          <p:attrName>style.visibility</p:attrName>
-                                        </p:attrNameLst>
-                                      </p:cBhvr>
-                                      <p:to>
-                                        <p:strVal val="visible"/>
-                                      </p:to>
-                                    </p:set>
-                                  </p:childTnLst>
-                                </p:cTn>
-                              </p:par>
-                              <p:par>
-                                <p:cTn id="25" presetID="1" presetClass="entr" presetSubtype="0" fill="hold" grpId="0" nodeType="withEffect">
-                                  <p:stCondLst>
-                                    <p:cond delay="0"/>
-                                  </p:stCondLst>
-                                  <p:childTnLst>
-                                    <p:set>
-                                      <p:cBhvr>
-                                        <p:cTn id="26" dur="1" fill="hold">
-                                          <p:stCondLst>
-                                            <p:cond delay="0"/>
-                                          </p:stCondLst>
-                                        </p:cTn>
-                                        <p:tgtEl>
-                                          <p:spTgt spid="3">
-                                            <p:txEl>
-                                              <p:pRg st="12" end="12"/>
-                                            </p:txEl>
-                                          </p:spTgt>
-                                        </p:tgtEl>
-                                        <p:attrNameLst>
-                                          <p:attrName>style.visibility</p:attrName>
-                                        </p:attrNameLst>
-                                      </p:cBhvr>
-                                      <p:to>
-                                        <p:strVal val="visible"/>
-                                      </p:to>
-                                    </p:set>
-                                  </p:childTnLst>
-                                </p:cTn>
-                              </p:par>
-                            </p:childTnLst>
-                          </p:cTn>
-                        </p:par>
-                      </p:childTnLst>
-                    </p:cTn>
-                  </p:par>
-                </p:childTnLst>
-              </p:cTn>
-              <p:prevCondLst>
-                <p:cond evt="onPrev" delay="0">
-                  <p:tgtEl>
-                    <p:sldTgt/>
-                  </p:tgtEl>
-                </p:cond>
-              </p:prevCondLst>
-              <p:nextCondLst>
-                <p:cond evt="onNext" delay="0">
-                  <p:tgtEl>
-                    <p:sldTgt/>
-                  </p:tgtEl>
-                </p:cond>
-              </p:nextCondLst>
-            </p:seq>
-          </p:childTnLst>
-        </p:cTn>
-      </p:par>
-    </p:tnLst>
-    <p:bldLst>
-      <p:bldP spid="3" grpId="0" build="p"/>
-    </p:bldLst>
-  </p:timing>
-</p:sld>
-</file>
-
 <file path=ppt/slides/slide5.xml><?xml version="1.0" encoding="utf-8"?>
 <p:sld xmlns:a="http://schemas.openxmlformats.org/drawingml/2006/main" xmlns:r="http://schemas.openxmlformats.org/officeDocument/2006/relationships" xmlns:p="http://schemas.openxmlformats.org/presentationml/2006/main">
   <p:cSld>
@@ -5588,7 +5666,9 @@
         </p:nvSpPr>
         <p:spPr/>
         <p:txBody>
-          <a:bodyPr/>
+          <a:bodyPr>
+            <a:normAutofit fontScale="92500" lnSpcReduction="10000"/>
+          </a:bodyPr>
           <a:lstStyle/>
           <a:p>
             <a:pPr marL="514350" indent="-514350">
@@ -5601,12 +5681,6 @@
             </a:r>
           </a:p>
           <a:p>
-            <a:pPr marL="0" indent="0">
-              <a:buNone/>
-            </a:pPr>
-            <a:endParaRPr lang="es-ES" dirty="0"/>
-          </a:p>
-          <a:p>
             <a:pPr lvl="1"/>
             <a:r>
               <a:rPr lang="es-EC" b="1" dirty="0"/>
@@ -5634,11 +5708,6 @@
               <a:rPr lang="es-ES" dirty="0"/>
               <a:t>.</a:t>
             </a:r>
-          </a:p>
-          <a:p>
-            <a:pPr marL="914400" lvl="2" indent="0">
-              <a:buNone/>
-            </a:pPr>
             <a:endParaRPr lang="es-EC" dirty="0"/>
           </a:p>
           <a:p>
@@ -5668,6 +5737,45 @@
               <a:rPr lang="es-EC" dirty="0"/>
               <a:t>Habilidades esenciales: comunicación, liderazgo, pensamiento crítico, etc.</a:t>
             </a:r>
+          </a:p>
+          <a:p>
+            <a:pPr lvl="1"/>
+            <a:r>
+              <a:rPr lang="es-EC" dirty="0"/>
+              <a:t>Modelo Educativo de la ESPOL</a:t>
+            </a:r>
+          </a:p>
+          <a:p>
+            <a:pPr lvl="2"/>
+            <a:r>
+              <a:rPr lang="es-ES" dirty="0"/>
+              <a:t>Participación en procesos de investigación</a:t>
+            </a:r>
+          </a:p>
+          <a:p>
+            <a:pPr lvl="2"/>
+            <a:r>
+              <a:rPr lang="es-ES" dirty="0"/>
+              <a:t>Involucramiento en proyectos que resuelven los problemas de la industria</a:t>
+            </a:r>
+          </a:p>
+          <a:p>
+            <a:pPr lvl="2"/>
+            <a:r>
+              <a:rPr lang="es-ES" dirty="0"/>
+              <a:t>Participación en equipos multidisciplinarios</a:t>
+            </a:r>
+          </a:p>
+          <a:p>
+            <a:pPr lvl="2"/>
+            <a:r>
+              <a:rPr lang="es-ES" dirty="0"/>
+              <a:t>En el contexto de litoral ecuatoriano</a:t>
+            </a:r>
+          </a:p>
+          <a:p>
+            <a:pPr lvl="1"/>
+            <a:endParaRPr lang="es-EC" dirty="0"/>
           </a:p>
           <a:p>
             <a:endParaRPr lang="es-EC" dirty="0"/>
@@ -5839,11 +5947,7 @@
             <a:pPr lvl="2"/>
             <a:r>
               <a:rPr lang="es-ES" dirty="0"/>
-              <a:t>Desarrollador de aplicaciones </a:t>
-            </a:r>
-            <a:r>
-              <a:rPr lang="es-ES" i="1" dirty="0"/>
-              <a:t>(procesamiento distribuido de grandes volúmenes de datos y la creación de modelos en la nube)</a:t>
+              <a:t>Desarrollador de aplicaciones basadas en datos y algoritmos inteligentes</a:t>
             </a:r>
             <a:endParaRPr lang="es-ES" dirty="0">
               <a:highlight>
@@ -6291,7 +6395,9 @@
         </p:nvSpPr>
         <p:spPr/>
         <p:txBody>
-          <a:bodyPr/>
+          <a:bodyPr>
+            <a:normAutofit lnSpcReduction="10000"/>
+          </a:bodyPr>
           <a:lstStyle/>
           <a:p>
             <a:pPr marL="514350" indent="-514350">
@@ -6354,14 +6460,26 @@
             </a:r>
             <a:r>
               <a:rPr lang="es-ES" dirty="0"/>
-              <a:t> significativo en la:</a:t>
+              <a:t> significativo:</a:t>
             </a:r>
           </a:p>
           <a:p>
             <a:pPr lvl="2"/>
             <a:r>
+              <a:rPr lang="es-ES" dirty="0"/>
+              <a:t>Del </a:t>
+            </a:r>
+            <a:r>
               <a:rPr lang="es-ES" b="1" dirty="0"/>
-              <a:t>Productividad </a:t>
+              <a:t>41,6% </a:t>
+            </a:r>
+            <a:r>
+              <a:rPr lang="es-ES" dirty="0"/>
+              <a:t>en la </a:t>
+            </a:r>
+            <a:r>
+              <a:rPr lang="es-ES" b="1" dirty="0"/>
+              <a:t>productividad </a:t>
             </a:r>
             <a:r>
               <a:rPr lang="es-ES" dirty="0"/>
@@ -6381,7 +6499,38 @@
             </a:r>
             <a:r>
               <a:rPr lang="es-EC" dirty="0"/>
-              <a:t> y </a:t>
+              <a:t> (</a:t>
+            </a:r>
+            <a:r>
+              <a:rPr lang="es-EC" dirty="0" err="1"/>
+              <a:t>Song</a:t>
+            </a:r>
+            <a:r>
+              <a:rPr lang="es-EC" dirty="0"/>
+              <a:t>, Agarwal y </a:t>
+            </a:r>
+            <a:r>
+              <a:rPr lang="es-EC" dirty="0" err="1"/>
+              <a:t>Wen</a:t>
+            </a:r>
+            <a:r>
+              <a:rPr lang="es-EC" dirty="0"/>
+              <a:t>., 2024).</a:t>
+            </a:r>
+          </a:p>
+          <a:p>
+            <a:pPr lvl="2"/>
+            <a:r>
+              <a:rPr lang="es-EC" dirty="0"/>
+              <a:t>Del </a:t>
+            </a:r>
+            <a:r>
+              <a:rPr lang="es-EC" b="1" dirty="0"/>
+              <a:t>10-20%</a:t>
+            </a:r>
+            <a:r>
+              <a:rPr lang="es-EC" dirty="0"/>
+              <a:t> para los </a:t>
             </a:r>
             <a:r>
               <a:rPr lang="es-EC" b="1" dirty="0"/>
@@ -6389,7 +6538,31 @@
             </a:r>
             <a:r>
               <a:rPr lang="es-EC" dirty="0"/>
-              <a:t> que usan modelos largos de lenguaje.</a:t>
+              <a:t> que usan modelos largos de lenguaje </a:t>
+            </a:r>
+            <a:r>
+              <a:rPr lang="es-ES" dirty="0"/>
+              <a:t>(</a:t>
+            </a:r>
+            <a:r>
+              <a:rPr lang="es-EC" dirty="0"/>
+              <a:t>Al-</a:t>
+            </a:r>
+            <a:r>
+              <a:rPr lang="es-EC" dirty="0" err="1"/>
+              <a:t>Raeei</a:t>
+            </a:r>
+            <a:r>
+              <a:rPr lang="es-EC" dirty="0"/>
+              <a:t>, 2025</a:t>
+            </a:r>
+            <a:r>
+              <a:rPr lang="es-ES" dirty="0"/>
+              <a:t>)</a:t>
+            </a:r>
+            <a:r>
+              <a:rPr lang="es-EC" dirty="0"/>
+              <a:t>.</a:t>
             </a:r>
           </a:p>
           <a:p>
@@ -6400,12 +6573,16 @@
             </a:r>
             <a:r>
               <a:rPr lang="es-ES" dirty="0"/>
-              <a:t>mediante la colaboración actores públicos y tecnológicos</a:t>
-            </a:r>
-            <a:endParaRPr lang="es-EC" dirty="0"/>
-          </a:p>
-          <a:p>
-            <a:pPr lvl="2"/>
+              <a:t>mediante la colaboración actores públicos y tecnológicos </a:t>
+            </a:r>
+            <a:r>
+              <a:rPr lang="es-ES" dirty="0" err="1"/>
+              <a:t>Korenik</a:t>
+            </a:r>
+            <a:r>
+              <a:rPr lang="es-ES" dirty="0"/>
+              <a:t> (2023). </a:t>
+            </a:r>
             <a:endParaRPr lang="es-EC" dirty="0"/>
           </a:p>
           <a:p>
@@ -6629,6 +6806,37 @@
                                           <p:spTgt spid="3">
                                             <p:txEl>
                                               <p:pRg st="6" end="6"/>
+                                            </p:txEl>
+                                          </p:spTgt>
+                                        </p:tgtEl>
+                                        <p:attrNameLst>
+                                          <p:attrName>style.visibility</p:attrName>
+                                        </p:attrNameLst>
+                                      </p:cBhvr>
+                                      <p:to>
+                                        <p:strVal val="visible"/>
+                                      </p:to>
+                                    </p:set>
+                                  </p:childTnLst>
+                                </p:cTn>
+                              </p:par>
+                              <p:par>
+                                <p:cTn id="19" presetID="1" presetClass="entr" presetSubtype="0" fill="hold" grpId="0" nodeType="withEffect">
+                                  <p:stCondLst>
+                                    <p:cond delay="0"/>
+                                  </p:stCondLst>
+                                  <p:childTnLst>
+                                    <p:set>
+                                      <p:cBhvr>
+                                        <p:cTn id="20" dur="1" fill="hold">
+                                          <p:stCondLst>
+                                            <p:cond delay="0"/>
+                                          </p:stCondLst>
+                                        </p:cTn>
+                                        <p:tgtEl>
+                                          <p:spTgt spid="3">
+                                            <p:txEl>
+                                              <p:pRg st="7" end="7"/>
                                             </p:txEl>
                                           </p:spTgt>
                                         </p:tgtEl>

</xml_diff>

<commit_message>
ready to perfiles de egreso
Aceptados todos los cambios. Faltan los perfiles de egreso.
</commit_message>
<xml_diff>
--- a/03 Presentación - CDIA.pptx
+++ b/03 Presentación - CDIA.pptx
@@ -14,8 +14,8 @@
     <p:sldId id="269" r:id="rId8"/>
     <p:sldId id="270" r:id="rId9"/>
     <p:sldId id="264" r:id="rId10"/>
-    <p:sldId id="261" r:id="rId11"/>
-    <p:sldId id="271" r:id="rId12"/>
+    <p:sldId id="271" r:id="rId11"/>
+    <p:sldId id="261" r:id="rId12"/>
     <p:sldId id="266" r:id="rId13"/>
     <p:sldId id="260" r:id="rId14"/>
   </p:sldIdLst>
@@ -273,7 +273,7 @@
           <a:p>
             <a:fld id="{EFF27265-5A35-4507-BA5A-A8DC4F8205C0}" type="datetimeFigureOut">
               <a:rPr lang="es-EC" smtClean="0"/>
-              <a:t>19/5/2025</a:t>
+              <a:t>20/5/2025</a:t>
             </a:fld>
             <a:endParaRPr lang="es-EC"/>
           </a:p>
@@ -473,7 +473,7 @@
           <a:p>
             <a:fld id="{EFF27265-5A35-4507-BA5A-A8DC4F8205C0}" type="datetimeFigureOut">
               <a:rPr lang="es-EC" smtClean="0"/>
-              <a:t>19/5/2025</a:t>
+              <a:t>20/5/2025</a:t>
             </a:fld>
             <a:endParaRPr lang="es-EC"/>
           </a:p>
@@ -683,7 +683,7 @@
           <a:p>
             <a:fld id="{EFF27265-5A35-4507-BA5A-A8DC4F8205C0}" type="datetimeFigureOut">
               <a:rPr lang="es-EC" smtClean="0"/>
-              <a:t>19/5/2025</a:t>
+              <a:t>20/5/2025</a:t>
             </a:fld>
             <a:endParaRPr lang="es-EC"/>
           </a:p>
@@ -883,7 +883,7 @@
           <a:p>
             <a:fld id="{EFF27265-5A35-4507-BA5A-A8DC4F8205C0}" type="datetimeFigureOut">
               <a:rPr lang="es-EC" smtClean="0"/>
-              <a:t>19/5/2025</a:t>
+              <a:t>20/5/2025</a:t>
             </a:fld>
             <a:endParaRPr lang="es-EC"/>
           </a:p>
@@ -1159,7 +1159,7 @@
           <a:p>
             <a:fld id="{EFF27265-5A35-4507-BA5A-A8DC4F8205C0}" type="datetimeFigureOut">
               <a:rPr lang="es-EC" smtClean="0"/>
-              <a:t>19/5/2025</a:t>
+              <a:t>20/5/2025</a:t>
             </a:fld>
             <a:endParaRPr lang="es-EC"/>
           </a:p>
@@ -1427,7 +1427,7 @@
           <a:p>
             <a:fld id="{EFF27265-5A35-4507-BA5A-A8DC4F8205C0}" type="datetimeFigureOut">
               <a:rPr lang="es-EC" smtClean="0"/>
-              <a:t>19/5/2025</a:t>
+              <a:t>20/5/2025</a:t>
             </a:fld>
             <a:endParaRPr lang="es-EC"/>
           </a:p>
@@ -1842,7 +1842,7 @@
           <a:p>
             <a:fld id="{EFF27265-5A35-4507-BA5A-A8DC4F8205C0}" type="datetimeFigureOut">
               <a:rPr lang="es-EC" smtClean="0"/>
-              <a:t>19/5/2025</a:t>
+              <a:t>20/5/2025</a:t>
             </a:fld>
             <a:endParaRPr lang="es-EC"/>
           </a:p>
@@ -1984,7 +1984,7 @@
           <a:p>
             <a:fld id="{EFF27265-5A35-4507-BA5A-A8DC4F8205C0}" type="datetimeFigureOut">
               <a:rPr lang="es-EC" smtClean="0"/>
-              <a:t>19/5/2025</a:t>
+              <a:t>20/5/2025</a:t>
             </a:fld>
             <a:endParaRPr lang="es-EC"/>
           </a:p>
@@ -2097,7 +2097,7 @@
           <a:p>
             <a:fld id="{EFF27265-5A35-4507-BA5A-A8DC4F8205C0}" type="datetimeFigureOut">
               <a:rPr lang="es-EC" smtClean="0"/>
-              <a:t>19/5/2025</a:t>
+              <a:t>20/5/2025</a:t>
             </a:fld>
             <a:endParaRPr lang="es-EC"/>
           </a:p>
@@ -2410,7 +2410,7 @@
           <a:p>
             <a:fld id="{EFF27265-5A35-4507-BA5A-A8DC4F8205C0}" type="datetimeFigureOut">
               <a:rPr lang="es-EC" smtClean="0"/>
-              <a:t>19/5/2025</a:t>
+              <a:t>20/5/2025</a:t>
             </a:fld>
             <a:endParaRPr lang="es-EC"/>
           </a:p>
@@ -2699,7 +2699,7 @@
           <a:p>
             <a:fld id="{EFF27265-5A35-4507-BA5A-A8DC4F8205C0}" type="datetimeFigureOut">
               <a:rPr lang="es-EC" smtClean="0"/>
-              <a:t>19/5/2025</a:t>
+              <a:t>20/5/2025</a:t>
             </a:fld>
             <a:endParaRPr lang="es-EC"/>
           </a:p>
@@ -2942,7 +2942,7 @@
           <a:p>
             <a:fld id="{EFF27265-5A35-4507-BA5A-A8DC4F8205C0}" type="datetimeFigureOut">
               <a:rPr lang="es-EC" smtClean="0"/>
-              <a:t>19/5/2025</a:t>
+              <a:t>20/5/2025</a:t>
             </a:fld>
             <a:endParaRPr lang="es-EC"/>
           </a:p>
@@ -3441,128 +3441,6 @@
   <p:cSld>
     <p:spTree>
       <p:nvGrpSpPr>
-        <p:cNvPr id="1" name=""/>
-        <p:cNvGrpSpPr/>
-        <p:nvPr/>
-      </p:nvGrpSpPr>
-      <p:grpSpPr>
-        <a:xfrm>
-          <a:off x="0" y="0"/>
-          <a:ext cx="0" cy="0"/>
-          <a:chOff x="0" y="0"/>
-          <a:chExt cx="0" cy="0"/>
-        </a:xfrm>
-      </p:grpSpPr>
-      <p:sp>
-        <p:nvSpPr>
-          <p:cNvPr id="2" name="Título 1">
-            <a:extLst>
-              <a:ext uri="{FF2B5EF4-FFF2-40B4-BE49-F238E27FC236}">
-                <a16:creationId xmlns:a16="http://schemas.microsoft.com/office/drawing/2014/main" id="{0C3FA965-AE29-DCF1-E968-B0985904DE2F}"/>
-              </a:ext>
-            </a:extLst>
-          </p:cNvPr>
-          <p:cNvSpPr>
-            <a:spLocks noGrp="1"/>
-          </p:cNvSpPr>
-          <p:nvPr>
-            <p:ph type="title"/>
-          </p:nvPr>
-        </p:nvSpPr>
-        <p:spPr/>
-        <p:txBody>
-          <a:bodyPr/>
-          <a:lstStyle/>
-          <a:p>
-            <a:r>
-              <a:rPr lang="es-EC" dirty="0"/>
-              <a:t>Perfil de Egreso (Competencias)</a:t>
-            </a:r>
-          </a:p>
-        </p:txBody>
-      </p:sp>
-      <p:sp>
-        <p:nvSpPr>
-          <p:cNvPr id="4" name="Marcador de contenido 3">
-            <a:extLst>
-              <a:ext uri="{FF2B5EF4-FFF2-40B4-BE49-F238E27FC236}">
-                <a16:creationId xmlns:a16="http://schemas.microsoft.com/office/drawing/2014/main" id="{EAB80870-96C7-9B57-CC27-1AA8D795A78A}"/>
-              </a:ext>
-            </a:extLst>
-          </p:cNvPr>
-          <p:cNvSpPr>
-            <a:spLocks noGrp="1"/>
-          </p:cNvSpPr>
-          <p:nvPr>
-            <p:ph idx="1"/>
-          </p:nvPr>
-        </p:nvSpPr>
-        <p:spPr/>
-        <p:txBody>
-          <a:bodyPr>
-            <a:normAutofit/>
-          </a:bodyPr>
-          <a:lstStyle/>
-          <a:p>
-            <a:pPr marL="0" indent="0">
-              <a:buNone/>
-            </a:pPr>
-            <a:r>
-              <a:rPr lang="es-ES" b="1" dirty="0"/>
-              <a:t>Gestionar </a:t>
-            </a:r>
-            <a:r>
-              <a:rPr lang="es-ES" dirty="0"/>
-              <a:t>hallazgos tecnológicos en los contextos de la analítica avanzada de datos y algoritmos inteligentes </a:t>
-            </a:r>
-            <a:r>
-              <a:rPr lang="es-ES" b="1" dirty="0"/>
-              <a:t>mediante</a:t>
-            </a:r>
-            <a:r>
-              <a:rPr lang="es-ES" dirty="0"/>
-              <a:t> la conexión entre los fundamentos teóricos, pensamiento crítico y la resolución práctica de problemas reales en un entorno científico </a:t>
-            </a:r>
-            <a:r>
-              <a:rPr lang="es-ES" b="1" dirty="0"/>
-              <a:t>para</a:t>
-            </a:r>
-            <a:r>
-              <a:rPr lang="es-ES" dirty="0"/>
-              <a:t> la generación de opiniones técnicas en la toma de decisiones en sectores estratégicos locales e internacionales </a:t>
-            </a:r>
-            <a:r>
-              <a:rPr lang="es-ES" b="1" dirty="0"/>
-              <a:t>asegurando</a:t>
-            </a:r>
-            <a:r>
-              <a:rPr lang="es-ES" dirty="0"/>
-              <a:t> la integridad, trazabilidad y relevancia de la información adaptada al público objetivo. </a:t>
-            </a:r>
-          </a:p>
-          <a:p>
-            <a:endParaRPr lang="es-EC" dirty="0"/>
-          </a:p>
-        </p:txBody>
-      </p:sp>
-    </p:spTree>
-    <p:extLst>
-      <p:ext uri="{BB962C8B-B14F-4D97-AF65-F5344CB8AC3E}">
-        <p14:creationId xmlns:p14="http://schemas.microsoft.com/office/powerpoint/2010/main" val="4032803547"/>
-      </p:ext>
-    </p:extLst>
-  </p:cSld>
-  <p:clrMapOvr>
-    <a:masterClrMapping/>
-  </p:clrMapOvr>
-</p:sld>
-</file>
-
-<file path=ppt/slides/slide11.xml><?xml version="1.0" encoding="utf-8"?>
-<p:sld xmlns:a="http://schemas.openxmlformats.org/drawingml/2006/main" xmlns:r="http://schemas.openxmlformats.org/officeDocument/2006/relationships" xmlns:p="http://schemas.openxmlformats.org/presentationml/2006/main">
-  <p:cSld>
-    <p:spTree>
-      <p:nvGrpSpPr>
         <p:cNvPr id="1" name="">
           <a:extLst>
             <a:ext uri="{FF2B5EF4-FFF2-40B4-BE49-F238E27FC236}">
@@ -3677,6 +3555,130 @@
     <p:extLst>
       <p:ext uri="{BB962C8B-B14F-4D97-AF65-F5344CB8AC3E}">
         <p14:creationId xmlns:p14="http://schemas.microsoft.com/office/powerpoint/2010/main" val="2971138158"/>
+      </p:ext>
+    </p:extLst>
+  </p:cSld>
+  <p:clrMapOvr>
+    <a:masterClrMapping/>
+  </p:clrMapOvr>
+</p:sld>
+</file>
+
+<file path=ppt/slides/slide11.xml><?xml version="1.0" encoding="utf-8"?>
+<p:sld xmlns:a="http://schemas.openxmlformats.org/drawingml/2006/main" xmlns:r="http://schemas.openxmlformats.org/officeDocument/2006/relationships" xmlns:p="http://schemas.openxmlformats.org/presentationml/2006/main">
+  <p:cSld>
+    <p:spTree>
+      <p:nvGrpSpPr>
+        <p:cNvPr id="1" name=""/>
+        <p:cNvGrpSpPr/>
+        <p:nvPr/>
+      </p:nvGrpSpPr>
+      <p:grpSpPr>
+        <a:xfrm>
+          <a:off x="0" y="0"/>
+          <a:ext cx="0" cy="0"/>
+          <a:chOff x="0" y="0"/>
+          <a:chExt cx="0" cy="0"/>
+        </a:xfrm>
+      </p:grpSpPr>
+      <p:sp>
+        <p:nvSpPr>
+          <p:cNvPr id="2" name="Título 1">
+            <a:extLst>
+              <a:ext uri="{FF2B5EF4-FFF2-40B4-BE49-F238E27FC236}">
+                <a16:creationId xmlns:a16="http://schemas.microsoft.com/office/drawing/2014/main" id="{0C3FA965-AE29-DCF1-E968-B0985904DE2F}"/>
+              </a:ext>
+            </a:extLst>
+          </p:cNvPr>
+          <p:cNvSpPr>
+            <a:spLocks noGrp="1"/>
+          </p:cNvSpPr>
+          <p:nvPr>
+            <p:ph type="title"/>
+          </p:nvPr>
+        </p:nvSpPr>
+        <p:spPr/>
+        <p:txBody>
+          <a:bodyPr/>
+          <a:lstStyle/>
+          <a:p>
+            <a:r>
+              <a:rPr lang="es-EC" dirty="0"/>
+              <a:t>Perfil de Egreso (Competencias)</a:t>
+            </a:r>
+          </a:p>
+        </p:txBody>
+      </p:sp>
+      <p:sp>
+        <p:nvSpPr>
+          <p:cNvPr id="4" name="Marcador de contenido 3">
+            <a:extLst>
+              <a:ext uri="{FF2B5EF4-FFF2-40B4-BE49-F238E27FC236}">
+                <a16:creationId xmlns:a16="http://schemas.microsoft.com/office/drawing/2014/main" id="{EAB80870-96C7-9B57-CC27-1AA8D795A78A}"/>
+              </a:ext>
+            </a:extLst>
+          </p:cNvPr>
+          <p:cNvSpPr>
+            <a:spLocks noGrp="1"/>
+          </p:cNvSpPr>
+          <p:nvPr>
+            <p:ph idx="1"/>
+          </p:nvPr>
+        </p:nvSpPr>
+        <p:spPr/>
+        <p:txBody>
+          <a:bodyPr>
+            <a:normAutofit/>
+          </a:bodyPr>
+          <a:lstStyle/>
+          <a:p>
+            <a:pPr marL="0" indent="0">
+              <a:buNone/>
+            </a:pPr>
+            <a:r>
+              <a:rPr lang="es-EC" b="1" dirty="0"/>
+              <a:t>Generar</a:t>
+            </a:r>
+            <a:r>
+              <a:rPr lang="es-EC" dirty="0"/>
+              <a:t> reportes tecnológicos </a:t>
+            </a:r>
+            <a:r>
+              <a:rPr lang="es-ES" dirty="0"/>
+              <a:t>en los contextos de la analítica avanzada de datos y algoritmos inteligentes </a:t>
+            </a:r>
+            <a:r>
+              <a:rPr lang="es-ES" b="1" dirty="0"/>
+              <a:t>mediante</a:t>
+            </a:r>
+            <a:r>
+              <a:rPr lang="es-ES" dirty="0"/>
+              <a:t> la conexión entre los fundamentos teóricos, pensamiento crítico y la resolución práctica de problemas reales en un entorno científico internacionales </a:t>
+            </a:r>
+            <a:r>
+              <a:rPr lang="es-ES" b="1" dirty="0"/>
+              <a:t>para</a:t>
+            </a:r>
+            <a:r>
+              <a:rPr lang="es-ES" dirty="0"/>
+              <a:t> la toma de decisiones en sectores estratégicos locales e internacionales </a:t>
+            </a:r>
+            <a:r>
+              <a:rPr lang="es-ES" b="1" dirty="0"/>
+              <a:t>asegurando</a:t>
+            </a:r>
+            <a:r>
+              <a:rPr lang="es-ES" dirty="0"/>
+              <a:t> la integridad, trazabilidad y relevancia de la información adaptada al público objetivo. </a:t>
+            </a:r>
+            <a:endParaRPr lang="es-EC" dirty="0"/>
+          </a:p>
+        </p:txBody>
+      </p:sp>
+    </p:spTree>
+    <p:extLst>
+      <p:ext uri="{BB962C8B-B14F-4D97-AF65-F5344CB8AC3E}">
+        <p14:creationId xmlns:p14="http://schemas.microsoft.com/office/powerpoint/2010/main" val="4032803547"/>
       </p:ext>
     </p:extLst>
   </p:cSld>
@@ -3775,8 +3777,16 @@
           <a:p>
             <a:pPr lvl="1"/>
             <a:r>
+              <a:rPr lang="es-ES" dirty="0">
+                <a:highlight>
+                  <a:srgbClr val="FFFF00"/>
+                </a:highlight>
+              </a:rPr>
+              <a:t>Arquitectura</a:t>
+            </a:r>
+            <a:r>
               <a:rPr lang="es-ES" dirty="0"/>
-              <a:t>Infraestructura para la gestión de datos en la nube</a:t>
+              <a:t> para la gestión de datos en la nube</a:t>
             </a:r>
             <a:endParaRPr lang="es-EC" dirty="0"/>
           </a:p>

</xml_diff>